<commit_message>
Presentación UX con errores corregidos.
</commit_message>
<xml_diff>
--- a/UX_PIverde.pptx
+++ b/UX_PIverde.pptx
@@ -286,6 +286,7 @@
 <file path=ppt/revisionInfo.xml><?xml version="1.0" encoding="utf-8"?>
 <p1510:revInfo xmlns:a="http://schemas.openxmlformats.org/drawingml/2006/main" xmlns:r="http://schemas.openxmlformats.org/officeDocument/2006/relationships" xmlns:p1510="http://schemas.microsoft.com/office/powerpoint/2015/10/main">
   <p1510:revLst>
+    <p1510:client id="{579B04C7-2F17-1536-11CE-EF838CDDBD2B}" v="1442" dt="2021-03-24T09:34:59.702"/>
     <p1510:client id="{6E825345-FB9E-1A71-5236-5836B35A4E27}" v="89" dt="2021-03-22T09:15:26.967"/>
   </p1510:revLst>
 </p1510:revInfo>
@@ -293,6 +294,191 @@
 
 <file path=ppt/changesInfos/changesInfo1.xml><?xml version="1.0" encoding="utf-8"?>
 <pc:chgInfo xmlns:a="http://schemas.openxmlformats.org/drawingml/2006/main" xmlns:r="http://schemas.openxmlformats.org/officeDocument/2006/relationships" xmlns:ac="http://schemas.microsoft.com/office/drawing/2013/main/command" xmlns:pc="http://schemas.microsoft.com/office/powerpoint/2013/main/command">
+  <pc:docChgLst>
+    <pc:chgData name="ENRIQUE IZQUIERDO JIMENEZ" userId="S::enizji@floridauniversitaria.es::e25b680e-727c-4fec-abeb-0c81af2c4058" providerId="AD" clId="Web-{579B04C7-2F17-1536-11CE-EF838CDDBD2B}"/>
+    <pc:docChg chg="modSld">
+      <pc:chgData name="ENRIQUE IZQUIERDO JIMENEZ" userId="S::enizji@floridauniversitaria.es::e25b680e-727c-4fec-abeb-0c81af2c4058" providerId="AD" clId="Web-{579B04C7-2F17-1536-11CE-EF838CDDBD2B}" dt="2021-03-24T09:34:59.702" v="851" actId="20577"/>
+      <pc:docMkLst>
+        <pc:docMk/>
+      </pc:docMkLst>
+      <pc:sldChg chg="addSp modSp">
+        <pc:chgData name="ENRIQUE IZQUIERDO JIMENEZ" userId="S::enizji@floridauniversitaria.es::e25b680e-727c-4fec-abeb-0c81af2c4058" providerId="AD" clId="Web-{579B04C7-2F17-1536-11CE-EF838CDDBD2B}" dt="2021-03-24T09:26:37.385" v="656" actId="20577"/>
+        <pc:sldMkLst>
+          <pc:docMk/>
+          <pc:sldMk cId="0" sldId="256"/>
+        </pc:sldMkLst>
+        <pc:spChg chg="add mod">
+          <ac:chgData name="ENRIQUE IZQUIERDO JIMENEZ" userId="S::enizji@floridauniversitaria.es::e25b680e-727c-4fec-abeb-0c81af2c4058" providerId="AD" clId="Web-{579B04C7-2F17-1536-11CE-EF838CDDBD2B}" dt="2021-03-24T09:26:01.728" v="653"/>
+          <ac:spMkLst>
+            <pc:docMk/>
+            <pc:sldMk cId="0" sldId="256"/>
+            <ac:spMk id="2" creationId="{74D11C50-D665-40AE-9531-900D2DE1A847}"/>
+          </ac:spMkLst>
+        </pc:spChg>
+        <pc:spChg chg="mod">
+          <ac:chgData name="ENRIQUE IZQUIERDO JIMENEZ" userId="S::enizji@floridauniversitaria.es::e25b680e-727c-4fec-abeb-0c81af2c4058" providerId="AD" clId="Web-{579B04C7-2F17-1536-11CE-EF838CDDBD2B}" dt="2021-03-24T09:23:42.352" v="633" actId="20577"/>
+          <ac:spMkLst>
+            <pc:docMk/>
+            <pc:sldMk cId="0" sldId="256"/>
+            <ac:spMk id="128" creationId="{00000000-0000-0000-0000-000000000000}"/>
+          </ac:spMkLst>
+        </pc:spChg>
+        <pc:spChg chg="mod">
+          <ac:chgData name="ENRIQUE IZQUIERDO JIMENEZ" userId="S::enizji@floridauniversitaria.es::e25b680e-727c-4fec-abeb-0c81af2c4058" providerId="AD" clId="Web-{579B04C7-2F17-1536-11CE-EF838CDDBD2B}" dt="2021-03-24T09:26:37.385" v="656" actId="20577"/>
+          <ac:spMkLst>
+            <pc:docMk/>
+            <pc:sldMk cId="0" sldId="256"/>
+            <ac:spMk id="129" creationId="{00000000-0000-0000-0000-000000000000}"/>
+          </ac:spMkLst>
+        </pc:spChg>
+      </pc:sldChg>
+      <pc:sldChg chg="modSp">
+        <pc:chgData name="ENRIQUE IZQUIERDO JIMENEZ" userId="S::enizji@floridauniversitaria.es::e25b680e-727c-4fec-abeb-0c81af2c4058" providerId="AD" clId="Web-{579B04C7-2F17-1536-11CE-EF838CDDBD2B}" dt="2021-03-24T09:23:50.477" v="635" actId="20577"/>
+        <pc:sldMkLst>
+          <pc:docMk/>
+          <pc:sldMk cId="0" sldId="257"/>
+        </pc:sldMkLst>
+        <pc:spChg chg="mod">
+          <ac:chgData name="ENRIQUE IZQUIERDO JIMENEZ" userId="S::enizji@floridauniversitaria.es::e25b680e-727c-4fec-abeb-0c81af2c4058" providerId="AD" clId="Web-{579B04C7-2F17-1536-11CE-EF838CDDBD2B}" dt="2021-03-24T09:23:50.477" v="635" actId="20577"/>
+          <ac:spMkLst>
+            <pc:docMk/>
+            <pc:sldMk cId="0" sldId="257"/>
+            <ac:spMk id="134" creationId="{00000000-0000-0000-0000-000000000000}"/>
+          </ac:spMkLst>
+        </pc:spChg>
+        <pc:spChg chg="mod">
+          <ac:chgData name="ENRIQUE IZQUIERDO JIMENEZ" userId="S::enizji@floridauniversitaria.es::e25b680e-727c-4fec-abeb-0c81af2c4058" providerId="AD" clId="Web-{579B04C7-2F17-1536-11CE-EF838CDDBD2B}" dt="2021-03-24T08:43:15.796" v="3" actId="20577"/>
+          <ac:spMkLst>
+            <pc:docMk/>
+            <pc:sldMk cId="0" sldId="257"/>
+            <ac:spMk id="135" creationId="{00000000-0000-0000-0000-000000000000}"/>
+          </ac:spMkLst>
+        </pc:spChg>
+      </pc:sldChg>
+      <pc:sldChg chg="modSp">
+        <pc:chgData name="ENRIQUE IZQUIERDO JIMENEZ" userId="S::enizji@floridauniversitaria.es::e25b680e-727c-4fec-abeb-0c81af2c4058" providerId="AD" clId="Web-{579B04C7-2F17-1536-11CE-EF838CDDBD2B}" dt="2021-03-24T09:34:59.702" v="851" actId="20577"/>
+        <pc:sldMkLst>
+          <pc:docMk/>
+          <pc:sldMk cId="0" sldId="258"/>
+        </pc:sldMkLst>
+        <pc:spChg chg="mod">
+          <ac:chgData name="ENRIQUE IZQUIERDO JIMENEZ" userId="S::enizji@floridauniversitaria.es::e25b680e-727c-4fec-abeb-0c81af2c4058" providerId="AD" clId="Web-{579B04C7-2F17-1536-11CE-EF838CDDBD2B}" dt="2021-03-24T09:23:57.040" v="636" actId="20577"/>
+          <ac:spMkLst>
+            <pc:docMk/>
+            <pc:sldMk cId="0" sldId="258"/>
+            <ac:spMk id="140" creationId="{00000000-0000-0000-0000-000000000000}"/>
+          </ac:spMkLst>
+        </pc:spChg>
+        <pc:spChg chg="mod">
+          <ac:chgData name="ENRIQUE IZQUIERDO JIMENEZ" userId="S::enizji@floridauniversitaria.es::e25b680e-727c-4fec-abeb-0c81af2c4058" providerId="AD" clId="Web-{579B04C7-2F17-1536-11CE-EF838CDDBD2B}" dt="2021-03-24T09:34:59.702" v="851" actId="20577"/>
+          <ac:spMkLst>
+            <pc:docMk/>
+            <pc:sldMk cId="0" sldId="258"/>
+            <ac:spMk id="141" creationId="{00000000-0000-0000-0000-000000000000}"/>
+          </ac:spMkLst>
+        </pc:spChg>
+      </pc:sldChg>
+      <pc:sldChg chg="modSp">
+        <pc:chgData name="ENRIQUE IZQUIERDO JIMENEZ" userId="S::enizji@floridauniversitaria.es::e25b680e-727c-4fec-abeb-0c81af2c4058" providerId="AD" clId="Web-{579B04C7-2F17-1536-11CE-EF838CDDBD2B}" dt="2021-03-24T09:24:01.430" v="637" actId="20577"/>
+        <pc:sldMkLst>
+          <pc:docMk/>
+          <pc:sldMk cId="0" sldId="259"/>
+        </pc:sldMkLst>
+        <pc:spChg chg="mod">
+          <ac:chgData name="ENRIQUE IZQUIERDO JIMENEZ" userId="S::enizji@floridauniversitaria.es::e25b680e-727c-4fec-abeb-0c81af2c4058" providerId="AD" clId="Web-{579B04C7-2F17-1536-11CE-EF838CDDBD2B}" dt="2021-03-24T09:24:01.430" v="637" actId="20577"/>
+          <ac:spMkLst>
+            <pc:docMk/>
+            <pc:sldMk cId="0" sldId="259"/>
+            <ac:spMk id="146" creationId="{00000000-0000-0000-0000-000000000000}"/>
+          </ac:spMkLst>
+        </pc:spChg>
+      </pc:sldChg>
+      <pc:sldChg chg="modSp">
+        <pc:chgData name="ENRIQUE IZQUIERDO JIMENEZ" userId="S::enizji@floridauniversitaria.es::e25b680e-727c-4fec-abeb-0c81af2c4058" providerId="AD" clId="Web-{579B04C7-2F17-1536-11CE-EF838CDDBD2B}" dt="2021-03-24T09:24:07.477" v="638" actId="20577"/>
+        <pc:sldMkLst>
+          <pc:docMk/>
+          <pc:sldMk cId="0" sldId="260"/>
+        </pc:sldMkLst>
+        <pc:spChg chg="mod">
+          <ac:chgData name="ENRIQUE IZQUIERDO JIMENEZ" userId="S::enizji@floridauniversitaria.es::e25b680e-727c-4fec-abeb-0c81af2c4058" providerId="AD" clId="Web-{579B04C7-2F17-1536-11CE-EF838CDDBD2B}" dt="2021-03-24T09:24:07.477" v="638" actId="20577"/>
+          <ac:spMkLst>
+            <pc:docMk/>
+            <pc:sldMk cId="0" sldId="260"/>
+            <ac:spMk id="152" creationId="{00000000-0000-0000-0000-000000000000}"/>
+          </ac:spMkLst>
+        </pc:spChg>
+      </pc:sldChg>
+      <pc:sldChg chg="modSp">
+        <pc:chgData name="ENRIQUE IZQUIERDO JIMENEZ" userId="S::enizji@floridauniversitaria.es::e25b680e-727c-4fec-abeb-0c81af2c4058" providerId="AD" clId="Web-{579B04C7-2F17-1536-11CE-EF838CDDBD2B}" dt="2021-03-24T09:24:14.508" v="639" actId="20577"/>
+        <pc:sldMkLst>
+          <pc:docMk/>
+          <pc:sldMk cId="0" sldId="261"/>
+        </pc:sldMkLst>
+        <pc:spChg chg="mod">
+          <ac:chgData name="ENRIQUE IZQUIERDO JIMENEZ" userId="S::enizji@floridauniversitaria.es::e25b680e-727c-4fec-abeb-0c81af2c4058" providerId="AD" clId="Web-{579B04C7-2F17-1536-11CE-EF838CDDBD2B}" dt="2021-03-24T09:24:14.508" v="639" actId="20577"/>
+          <ac:spMkLst>
+            <pc:docMk/>
+            <pc:sldMk cId="0" sldId="261"/>
+            <ac:spMk id="158" creationId="{00000000-0000-0000-0000-000000000000}"/>
+          </ac:spMkLst>
+        </pc:spChg>
+        <pc:spChg chg="mod">
+          <ac:chgData name="ENRIQUE IZQUIERDO JIMENEZ" userId="S::enizji@floridauniversitaria.es::e25b680e-727c-4fec-abeb-0c81af2c4058" providerId="AD" clId="Web-{579B04C7-2F17-1536-11CE-EF838CDDBD2B}" dt="2021-03-24T09:13:46.065" v="476" actId="20577"/>
+          <ac:spMkLst>
+            <pc:docMk/>
+            <pc:sldMk cId="0" sldId="261"/>
+            <ac:spMk id="159" creationId="{00000000-0000-0000-0000-000000000000}"/>
+          </ac:spMkLst>
+        </pc:spChg>
+      </pc:sldChg>
+      <pc:sldChg chg="modSp">
+        <pc:chgData name="ENRIQUE IZQUIERDO JIMENEZ" userId="S::enizji@floridauniversitaria.es::e25b680e-727c-4fec-abeb-0c81af2c4058" providerId="AD" clId="Web-{579B04C7-2F17-1536-11CE-EF838CDDBD2B}" dt="2021-03-24T09:24:20.352" v="640" actId="20577"/>
+        <pc:sldMkLst>
+          <pc:docMk/>
+          <pc:sldMk cId="0" sldId="262"/>
+        </pc:sldMkLst>
+        <pc:spChg chg="mod">
+          <ac:chgData name="ENRIQUE IZQUIERDO JIMENEZ" userId="S::enizji@floridauniversitaria.es::e25b680e-727c-4fec-abeb-0c81af2c4058" providerId="AD" clId="Web-{579B04C7-2F17-1536-11CE-EF838CDDBD2B}" dt="2021-03-24T09:24:20.352" v="640" actId="20577"/>
+          <ac:spMkLst>
+            <pc:docMk/>
+            <pc:sldMk cId="0" sldId="262"/>
+            <ac:spMk id="164" creationId="{00000000-0000-0000-0000-000000000000}"/>
+          </ac:spMkLst>
+        </pc:spChg>
+        <pc:graphicFrameChg chg="mod modGraphic">
+          <ac:chgData name="ENRIQUE IZQUIERDO JIMENEZ" userId="S::enizji@floridauniversitaria.es::e25b680e-727c-4fec-abeb-0c81af2c4058" providerId="AD" clId="Web-{579B04C7-2F17-1536-11CE-EF838CDDBD2B}" dt="2021-03-24T09:14:09.549" v="478"/>
+          <ac:graphicFrameMkLst>
+            <pc:docMk/>
+            <pc:sldMk cId="0" sldId="262"/>
+            <ac:graphicFrameMk id="165" creationId="{00000000-0000-0000-0000-000000000000}"/>
+          </ac:graphicFrameMkLst>
+        </pc:graphicFrameChg>
+      </pc:sldChg>
+      <pc:sldChg chg="modSp">
+        <pc:chgData name="ENRIQUE IZQUIERDO JIMENEZ" userId="S::enizji@floridauniversitaria.es::e25b680e-727c-4fec-abeb-0c81af2c4058" providerId="AD" clId="Web-{579B04C7-2F17-1536-11CE-EF838CDDBD2B}" dt="2021-03-24T09:24:25.977" v="641" actId="20577"/>
+        <pc:sldMkLst>
+          <pc:docMk/>
+          <pc:sldMk cId="0" sldId="263"/>
+        </pc:sldMkLst>
+        <pc:spChg chg="mod">
+          <ac:chgData name="ENRIQUE IZQUIERDO JIMENEZ" userId="S::enizji@floridauniversitaria.es::e25b680e-727c-4fec-abeb-0c81af2c4058" providerId="AD" clId="Web-{579B04C7-2F17-1536-11CE-EF838CDDBD2B}" dt="2021-03-24T09:24:25.977" v="641" actId="20577"/>
+          <ac:spMkLst>
+            <pc:docMk/>
+            <pc:sldMk cId="0" sldId="263"/>
+            <ac:spMk id="170" creationId="{00000000-0000-0000-0000-000000000000}"/>
+          </ac:spMkLst>
+        </pc:spChg>
+        <pc:graphicFrameChg chg="mod modGraphic">
+          <ac:chgData name="ENRIQUE IZQUIERDO JIMENEZ" userId="S::enizji@floridauniversitaria.es::e25b680e-727c-4fec-abeb-0c81af2c4058" providerId="AD" clId="Web-{579B04C7-2F17-1536-11CE-EF838CDDBD2B}" dt="2021-03-24T09:14:27.409" v="480"/>
+          <ac:graphicFrameMkLst>
+            <pc:docMk/>
+            <pc:sldMk cId="0" sldId="263"/>
+            <ac:graphicFrameMk id="171" creationId="{00000000-0000-0000-0000-000000000000}"/>
+          </ac:graphicFrameMkLst>
+        </pc:graphicFrameChg>
+      </pc:sldChg>
+    </pc:docChg>
+  </pc:docChgLst>
   <pc:docChgLst>
     <pc:chgData name="ENRIQUE IZQUIERDO JIMENEZ" userId="S::enizji@floridauniversitaria.es::e25b680e-727c-4fec-abeb-0c81af2c4058" providerId="AD" clId="Web-{6E825345-FB9E-1A71-5236-5836B35A4E27}"/>
     <pc:docChg chg="modSld">
@@ -9625,7 +9811,7 @@
         </p:nvSpPr>
         <p:spPr>
           <a:xfrm>
-            <a:off x="1858703" y="1501364"/>
+            <a:off x="1890018" y="1243014"/>
             <a:ext cx="5361300" cy="1448100"/>
           </a:xfrm>
           <a:prstGeom prst="rect">
@@ -9639,7 +9825,11 @@
           <a:lstStyle/>
           <a:p>
             <a:r>
-              <a:rPr lang="es" dirty="0"/>
+              <a:rPr lang="es" dirty="0">
+                <a:solidFill>
+                  <a:srgbClr val="000000"/>
+                </a:solidFill>
+              </a:rPr>
               <a:t>Experiencia del Usuario</a:t>
             </a:r>
           </a:p>
@@ -9657,7 +9847,7 @@
         </p:nvSpPr>
         <p:spPr>
           <a:xfrm>
-            <a:off x="1887275" y="2848802"/>
+            <a:off x="1887275" y="2426049"/>
             <a:ext cx="5361300" cy="522600"/>
           </a:xfrm>
           <a:prstGeom prst="rect">
@@ -9672,10 +9862,151 @@
           <a:p>
             <a:pPr marL="0" indent="0"/>
             <a:r>
-              <a:rPr lang="es-ES" dirty="0"/>
-              <a:t>Proyecto Integrado – equipo Verde</a:t>
+              <a:rPr lang="es-ES" sz="2000" dirty="0">
+                <a:solidFill>
+                  <a:srgbClr val="000000"/>
+                </a:solidFill>
+              </a:rPr>
+              <a:t>Proyecto Integrado – Equipo Verde</a:t>
             </a:r>
-            <a:endParaRPr dirty="0"/>
+          </a:p>
+        </p:txBody>
+      </p:sp>
+      <p:sp>
+        <p:nvSpPr>
+          <p:cNvPr id="2" name="CuadroTexto 1">
+            <a:extLst>
+              <a:ext uri="{FF2B5EF4-FFF2-40B4-BE49-F238E27FC236}">
+                <a16:creationId xmlns:a16="http://schemas.microsoft.com/office/drawing/2014/main" id="{74D11C50-D665-40AE-9531-900D2DE1A847}"/>
+              </a:ext>
+            </a:extLst>
+          </p:cNvPr>
+          <p:cNvSpPr txBox="1"/>
+          <p:nvPr/>
+        </p:nvSpPr>
+        <p:spPr>
+          <a:xfrm>
+            <a:off x="6190989" y="3329575"/>
+            <a:ext cx="2735371" cy="1600438"/>
+          </a:xfrm>
+          <a:prstGeom prst="rect">
+            <a:avLst/>
+          </a:prstGeom>
+          <a:noFill/>
+        </p:spPr>
+        <p:txBody>
+          <a:bodyPr rot="0" spcFirstLastPara="0" vertOverflow="overflow" horzOverflow="overflow" vert="horz" wrap="square" lIns="91440" tIns="45720" rIns="91440" bIns="45720" numCol="1" spcCol="0" rtlCol="0" fromWordArt="0" anchor="t" anchorCtr="0" forceAA="0" compatLnSpc="1">
+            <a:prstTxWarp prst="textNoShape">
+              <a:avLst/>
+            </a:prstTxWarp>
+            <a:spAutoFit/>
+          </a:bodyPr>
+          <a:lstStyle/>
+          <a:p>
+            <a:r>
+              <a:rPr lang="es-ES" u="sng" dirty="0">
+                <a:latin typeface="Calibri"/>
+                <a:cs typeface="Calibri"/>
+              </a:rPr>
+              <a:t>Equipo Verde, 1ºDAM grupo A</a:t>
+            </a:r>
+            <a:endParaRPr lang="es-ES">
+              <a:latin typeface="Calibri"/>
+              <a:cs typeface="Calibri"/>
+            </a:endParaRPr>
+          </a:p>
+          <a:p>
+            <a:r>
+              <a:rPr lang="es-ES" dirty="0">
+                <a:latin typeface="Calibri"/>
+                <a:cs typeface="Calibri"/>
+              </a:rPr>
+              <a:t>   Alejandro Giner Ferrando</a:t>
+            </a:r>
+          </a:p>
+          <a:p>
+            <a:r>
+              <a:rPr lang="es-ES" dirty="0">
+                <a:latin typeface="Calibri"/>
+                <a:cs typeface="Calibri"/>
+              </a:rPr>
+              <a:t>   Enrique Izquierdo Jiménez </a:t>
+            </a:r>
+          </a:p>
+          <a:p>
+            <a:r>
+              <a:rPr lang="es-ES" dirty="0">
+                <a:latin typeface="Calibri"/>
+                <a:cs typeface="Calibri"/>
+              </a:rPr>
+              <a:t>   </a:t>
+            </a:r>
+            <a:r>
+              <a:rPr lang="es-ES" dirty="0" err="1">
+                <a:latin typeface="Calibri"/>
+                <a:cs typeface="Calibri"/>
+              </a:rPr>
+              <a:t>Yosu</a:t>
+            </a:r>
+            <a:r>
+              <a:rPr lang="es-ES" dirty="0">
+                <a:latin typeface="Calibri"/>
+                <a:cs typeface="Calibri"/>
+              </a:rPr>
+              <a:t> </a:t>
+            </a:r>
+            <a:r>
+              <a:rPr lang="es-ES" dirty="0" err="1">
+                <a:latin typeface="Calibri"/>
+                <a:cs typeface="Calibri"/>
+              </a:rPr>
+              <a:t>Litago</a:t>
+            </a:r>
+            <a:r>
+              <a:rPr lang="es-ES" dirty="0">
+                <a:latin typeface="Calibri"/>
+                <a:cs typeface="Calibri"/>
+              </a:rPr>
+              <a:t> </a:t>
+            </a:r>
+            <a:r>
+              <a:rPr lang="es-ES" dirty="0" err="1">
+                <a:latin typeface="Calibri"/>
+                <a:cs typeface="Calibri"/>
+              </a:rPr>
+              <a:t>Albuixech</a:t>
+            </a:r>
+            <a:endParaRPr lang="es-ES" dirty="0">
+              <a:latin typeface="Calibri"/>
+              <a:cs typeface="Calibri"/>
+            </a:endParaRPr>
+          </a:p>
+          <a:p>
+            <a:r>
+              <a:rPr lang="es-ES" dirty="0">
+                <a:latin typeface="Calibri"/>
+                <a:cs typeface="Calibri"/>
+              </a:rPr>
+              <a:t>   Jaume Mir Fortea</a:t>
+            </a:r>
+          </a:p>
+          <a:p>
+            <a:r>
+              <a:rPr lang="es-ES" dirty="0">
+                <a:latin typeface="Calibri"/>
+                <a:cs typeface="Calibri"/>
+              </a:rPr>
+              <a:t>   Francisco José Pastor Ruiz</a:t>
+            </a:r>
+          </a:p>
+          <a:p>
+            <a:r>
+              <a:rPr lang="es-ES" dirty="0">
+                <a:latin typeface="Calibri"/>
+                <a:cs typeface="Calibri"/>
+              </a:rPr>
+              <a:t>   Oscar Talavera Sáez</a:t>
+            </a:r>
           </a:p>
         </p:txBody>
       </p:sp>
@@ -9739,10 +10070,34 @@
               <a:buNone/>
             </a:pPr>
             <a:r>
-              <a:rPr lang="es"/>
-              <a:t>Business Requirements (1/2)</a:t>
+              <a:rPr lang="es" dirty="0">
+                <a:solidFill>
+                  <a:srgbClr val="000000"/>
+                </a:solidFill>
+              </a:rPr>
+              <a:t>Business </a:t>
             </a:r>
-            <a:endParaRPr/>
+            <a:r>
+              <a:rPr lang="es" dirty="0" err="1">
+                <a:solidFill>
+                  <a:srgbClr val="000000"/>
+                </a:solidFill>
+              </a:rPr>
+              <a:t>Requirements</a:t>
+            </a:r>
+            <a:r>
+              <a:rPr lang="es" dirty="0">
+                <a:solidFill>
+                  <a:srgbClr val="000000"/>
+                </a:solidFill>
+              </a:rPr>
+              <a:t> (1/2)</a:t>
+            </a:r>
+            <a:endParaRPr lang="es-ES" dirty="0">
+              <a:solidFill>
+                <a:srgbClr val="000000"/>
+              </a:solidFill>
+            </a:endParaRPr>
           </a:p>
         </p:txBody>
       </p:sp>
@@ -9771,27 +10126,21 @@
           </a:bodyPr>
           <a:lstStyle/>
           <a:p>
-            <a:pPr marL="0" lvl="0" indent="0" algn="l" rtl="0">
+            <a:pPr marL="0" indent="0">
               <a:lnSpc>
                 <a:spcPct val="105000"/>
               </a:lnSpc>
-              <a:spcBef>
-                <a:spcPts val="0"/>
-              </a:spcBef>
-              <a:spcAft>
-                <a:spcPts val="0"/>
-              </a:spcAft>
               <a:buSzPts val="275"/>
               <a:buNone/>
             </a:pPr>
             <a:r>
-              <a:rPr lang="es" sz="1325" b="1"/>
-              <a:t>¿Cuáles son los objetivos? </a:t>
+              <a:rPr lang="es" b="1" dirty="0"/>
+              <a:t>¿Cuáles son los objetivos? </a:t>
             </a:r>
             <a:endParaRPr sz="1325" b="1"/>
           </a:p>
           <a:p>
-            <a:pPr marL="179999" lvl="0" indent="0" algn="l" rtl="0">
+            <a:pPr marL="179705" lvl="0" indent="0" algn="l" rtl="0">
               <a:lnSpc>
                 <a:spcPct val="105000"/>
               </a:lnSpc>
@@ -9805,58 +10154,140 @@
               <a:buNone/>
             </a:pPr>
             <a:r>
-              <a:rPr lang="es" sz="1325"/>
+              <a:rPr lang="es" dirty="0"/>
               <a:t>Generar un punto de encuentro para deportistas que quieren practicar deporte en compañía.</a:t>
+            </a:r>
+            <a:endParaRPr dirty="0"/>
+          </a:p>
+          <a:p>
+            <a:pPr marL="0" indent="0">
+              <a:lnSpc>
+                <a:spcPct val="105000"/>
+              </a:lnSpc>
+              <a:spcBef>
+                <a:spcPts val="1200"/>
+              </a:spcBef>
+              <a:buSzPts val="275"/>
+              <a:buNone/>
+            </a:pPr>
+            <a:r>
+              <a:rPr lang="es" b="1" dirty="0"/>
+              <a:t>¿Qué haría que la app tuviera éxito? </a:t>
+            </a:r>
+            <a:endParaRPr sz="1325" b="1"/>
+          </a:p>
+          <a:p>
+            <a:pPr marL="179705" lvl="0" indent="0" algn="l" rtl="0">
+              <a:lnSpc>
+                <a:spcPct val="105000"/>
+              </a:lnSpc>
+              <a:spcBef>
+                <a:spcPts val="1200"/>
+              </a:spcBef>
+              <a:spcAft>
+                <a:spcPts val="0"/>
+              </a:spcAft>
+              <a:buSzPts val="275"/>
+              <a:buNone/>
+            </a:pPr>
+            <a:r>
+              <a:rPr lang="es" dirty="0"/>
+              <a:t>La app debe permitir al usuario:</a:t>
+            </a:r>
+            <a:endParaRPr dirty="0"/>
+          </a:p>
+          <a:p>
+            <a:pPr marL="457200" lvl="0" indent="-312420" algn="l" rtl="0">
+              <a:lnSpc>
+                <a:spcPct val="105000"/>
+              </a:lnSpc>
+              <a:spcBef>
+                <a:spcPts val="1200"/>
+              </a:spcBef>
+              <a:spcAft>
+                <a:spcPts val="0"/>
+              </a:spcAft>
+              <a:buSzPts val="1325"/>
+              <a:buChar char="●"/>
+            </a:pPr>
+            <a:r>
+              <a:rPr lang="es" dirty="0"/>
+              <a:t>Buscar actividades deportivas por proximidad geográfica, tipo de evento, fecha, etc.</a:t>
+            </a:r>
+            <a:endParaRPr dirty="0"/>
+          </a:p>
+          <a:p>
+            <a:pPr marL="457200" lvl="0" indent="-312420" algn="l" rtl="0">
+              <a:lnSpc>
+                <a:spcPct val="105000"/>
+              </a:lnSpc>
+              <a:spcBef>
+                <a:spcPts val="0"/>
+              </a:spcBef>
+              <a:spcAft>
+                <a:spcPts val="0"/>
+              </a:spcAft>
+              <a:buSzPts val="1325"/>
+              <a:buChar char="●"/>
+            </a:pPr>
+            <a:r>
+              <a:rPr lang="es" dirty="0"/>
+              <a:t>Organizar actividades deportivas en las que puedan inscribirse otros usuarios.</a:t>
+            </a:r>
+            <a:endParaRPr dirty="0"/>
+          </a:p>
+          <a:p>
+            <a:pPr indent="-312420">
+              <a:lnSpc>
+                <a:spcPct val="105000"/>
+              </a:lnSpc>
+              <a:buSzPts val="1325"/>
+            </a:pPr>
+            <a:r>
+              <a:rPr lang="es" dirty="0"/>
+              <a:t>Valorar a los usuarios y organizadores de eventos con los que hemos compartido actividades.</a:t>
+            </a:r>
+          </a:p>
+          <a:p>
+            <a:pPr marL="457200" lvl="0" indent="-312420" algn="l" rtl="0">
+              <a:lnSpc>
+                <a:spcPct val="105000"/>
+              </a:lnSpc>
+              <a:spcBef>
+                <a:spcPts val="0"/>
+              </a:spcBef>
+              <a:spcAft>
+                <a:spcPts val="0"/>
+              </a:spcAft>
+              <a:buSzPts val="1325"/>
+              <a:buChar char="●"/>
+            </a:pPr>
+            <a:r>
+              <a:rPr lang="es" dirty="0"/>
+              <a:t>Conocer la valoración dada por otros usuarios a los organizadores y participantes inscritos a la actividad.</a:t>
+            </a:r>
+            <a:endParaRPr dirty="0"/>
+          </a:p>
+          <a:p>
+            <a:pPr indent="-312420">
+              <a:lnSpc>
+                <a:spcPct val="105000"/>
+              </a:lnSpc>
+              <a:buSzPts val="1325"/>
+            </a:pPr>
+            <a:r>
+              <a:rPr lang="es" dirty="0"/>
+              <a:t>Contactar con los organizadores y participantes de la actividad deportiva. </a:t>
             </a:r>
             <a:endParaRPr sz="1325"/>
           </a:p>
           <a:p>
-            <a:pPr marL="0" lvl="0" indent="0" algn="l" rtl="0">
+            <a:pPr marL="457200" lvl="0" indent="-312420" algn="l" rtl="0">
               <a:lnSpc>
                 <a:spcPct val="105000"/>
               </a:lnSpc>
               <a:spcBef>
-                <a:spcPts val="1200"/>
-              </a:spcBef>
-              <a:spcAft>
-                <a:spcPts val="0"/>
-              </a:spcAft>
-              <a:buSzPts val="275"/>
-              <a:buNone/>
-            </a:pPr>
-            <a:r>
-              <a:rPr lang="es" sz="1325" b="1"/>
-              <a:t>¿Qué haría que la app tuviera éxito? </a:t>
-            </a:r>
-            <a:endParaRPr sz="1325" b="1"/>
-          </a:p>
-          <a:p>
-            <a:pPr marL="179999" lvl="0" indent="0" algn="l" rtl="0">
-              <a:lnSpc>
-                <a:spcPct val="105000"/>
-              </a:lnSpc>
-              <a:spcBef>
-                <a:spcPts val="1200"/>
-              </a:spcBef>
-              <a:spcAft>
-                <a:spcPts val="0"/>
-              </a:spcAft>
-              <a:buSzPts val="275"/>
-              <a:buNone/>
-            </a:pPr>
-            <a:r>
-              <a:rPr lang="es" sz="1325"/>
-              <a:t>La app debe permitir al usuario:</a:t>
-            </a:r>
-            <a:endParaRPr sz="1325"/>
-          </a:p>
-          <a:p>
-            <a:pPr marL="457200" lvl="0" indent="-312737" algn="l" rtl="0">
-              <a:lnSpc>
-                <a:spcPct val="105000"/>
-              </a:lnSpc>
-              <a:spcBef>
-                <a:spcPts val="1200"/>
+                <a:spcPts val="0"/>
               </a:spcBef>
               <a:spcAft>
                 <a:spcPts val="0"/>
@@ -9864,94 +10295,10 @@
               <a:buSzPts val="1325"/>
               <a:buChar char="●"/>
             </a:pPr>
-            <a:r>
-              <a:rPr lang="es" sz="1325"/>
-              <a:t>Buscar actividades deportivas por proximidad geográfica, tipo de evento, fecha, etc.</a:t>
-            </a:r>
-            <a:endParaRPr sz="1325"/>
+            <a:endParaRPr lang="es" dirty="0"/>
           </a:p>
           <a:p>
-            <a:pPr marL="457200" lvl="0" indent="-312737" algn="l" rtl="0">
-              <a:lnSpc>
-                <a:spcPct val="105000"/>
-              </a:lnSpc>
-              <a:spcBef>
-                <a:spcPts val="0"/>
-              </a:spcBef>
-              <a:spcAft>
-                <a:spcPts val="0"/>
-              </a:spcAft>
-              <a:buSzPts val="1325"/>
-              <a:buChar char="●"/>
-            </a:pPr>
-            <a:r>
-              <a:rPr lang="es" sz="1325"/>
-              <a:t>Organizar actividades deportivas en las que puedan inscribirse otros usuarios.</a:t>
-            </a:r>
-            <a:endParaRPr sz="1325"/>
-          </a:p>
-          <a:p>
-            <a:pPr marL="457200" lvl="0" indent="-312737" algn="l" rtl="0">
-              <a:lnSpc>
-                <a:spcPct val="105000"/>
-              </a:lnSpc>
-              <a:spcBef>
-                <a:spcPts val="0"/>
-              </a:spcBef>
-              <a:spcAft>
-                <a:spcPts val="0"/>
-              </a:spcAft>
-              <a:buSzPts val="1325"/>
-              <a:buChar char="●"/>
-            </a:pPr>
-            <a:r>
-              <a:rPr lang="es" sz="1325"/>
-              <a:t>Conocer la valoración dada por otros usuarios a los organizadores y participantes inscritos a la actividad.</a:t>
-            </a:r>
-            <a:endParaRPr sz="1325"/>
-          </a:p>
-          <a:p>
-            <a:pPr marL="457200" lvl="0" indent="-312737" algn="l" rtl="0">
-              <a:lnSpc>
-                <a:spcPct val="105000"/>
-              </a:lnSpc>
-              <a:spcBef>
-                <a:spcPts val="0"/>
-              </a:spcBef>
-              <a:spcAft>
-                <a:spcPts val="0"/>
-              </a:spcAft>
-              <a:buSzPts val="1325"/>
-              <a:buChar char="●"/>
-            </a:pPr>
-            <a:r>
-              <a:rPr lang="es" sz="1325"/>
-              <a:t>Contactar con los organizadores y participantes de la actividad deportiva. </a:t>
-            </a:r>
-            <a:endParaRPr sz="1325"/>
-          </a:p>
-          <a:p>
-            <a:pPr marL="457200" lvl="0" indent="-312737" algn="l" rtl="0">
-              <a:lnSpc>
-                <a:spcPct val="105000"/>
-              </a:lnSpc>
-              <a:spcBef>
-                <a:spcPts val="0"/>
-              </a:spcBef>
-              <a:spcAft>
-                <a:spcPts val="0"/>
-              </a:spcAft>
-              <a:buSzPts val="1325"/>
-              <a:buChar char="●"/>
-            </a:pPr>
-            <a:r>
-              <a:rPr lang="es" sz="1325"/>
-              <a:t>Valorar a los usuarios y organizadores de eventos con los que hemos compartido actividades.</a:t>
-            </a:r>
-            <a:endParaRPr sz="1325"/>
-          </a:p>
-          <a:p>
-            <a:pPr marL="179999" lvl="0" indent="0" algn="l" rtl="0">
+            <a:pPr marL="179705" lvl="0" indent="0" algn="l" rtl="0">
               <a:lnSpc>
                 <a:spcPct val="105000"/>
               </a:lnSpc>
@@ -10028,10 +10375,34 @@
               <a:buNone/>
             </a:pPr>
             <a:r>
-              <a:rPr lang="es"/>
-              <a:t>Business Requirements (2/2)</a:t>
+              <a:rPr lang="es" dirty="0">
+                <a:solidFill>
+                  <a:srgbClr val="000000"/>
+                </a:solidFill>
+              </a:rPr>
+              <a:t>Business </a:t>
             </a:r>
-            <a:endParaRPr/>
+            <a:r>
+              <a:rPr lang="es" dirty="0" err="1">
+                <a:solidFill>
+                  <a:srgbClr val="000000"/>
+                </a:solidFill>
+              </a:rPr>
+              <a:t>Requirements</a:t>
+            </a:r>
+            <a:r>
+              <a:rPr lang="es" dirty="0">
+                <a:solidFill>
+                  <a:srgbClr val="000000"/>
+                </a:solidFill>
+              </a:rPr>
+              <a:t> (2/2)</a:t>
+            </a:r>
+            <a:endParaRPr lang="es-ES" dirty="0">
+              <a:solidFill>
+                <a:srgbClr val="000000"/>
+              </a:solidFill>
+            </a:endParaRPr>
           </a:p>
         </p:txBody>
       </p:sp>
@@ -10074,13 +10445,13 @@
               <a:buNone/>
             </a:pPr>
             <a:r>
-              <a:rPr lang="es" sz="1325" b="1"/>
+              <a:rPr lang="es" b="1" dirty="0"/>
               <a:t>¿A quién va dirigida?</a:t>
             </a:r>
-            <a:endParaRPr sz="1325" b="1"/>
+            <a:endParaRPr lang="es-ES" b="1"/>
           </a:p>
           <a:p>
-            <a:pPr marL="179999" lvl="0" indent="0" algn="l" rtl="0">
+            <a:pPr marL="179705" lvl="0" indent="0" algn="l" rtl="0">
               <a:lnSpc>
                 <a:spcPct val="105000"/>
               </a:lnSpc>
@@ -10094,13 +10465,13 @@
               <a:buNone/>
             </a:pPr>
             <a:r>
-              <a:rPr lang="es" sz="1325"/>
+              <a:rPr lang="es" dirty="0"/>
               <a:t>A aficionados al deporte que buscan personas con quien practicarlo.</a:t>
             </a:r>
-            <a:endParaRPr sz="1325" b="1"/>
+            <a:endParaRPr b="1" dirty="0"/>
           </a:p>
           <a:p>
-            <a:pPr marL="0" lvl="0" indent="0" algn="l" rtl="0">
+            <a:pPr marL="0" lvl="0" indent="0" algn="l">
               <a:lnSpc>
                 <a:spcPct val="105000"/>
               </a:lnSpc>
@@ -10114,73 +10485,53 @@
               <a:buNone/>
             </a:pPr>
             <a:r>
-              <a:rPr lang="es" sz="1325" b="1"/>
+              <a:rPr lang="es" b="1" dirty="0"/>
               <a:t>¿Por qué deberían utilizarla?</a:t>
             </a:r>
-            <a:endParaRPr sz="1325" b="1"/>
+            <a:endParaRPr b="1" dirty="0"/>
           </a:p>
           <a:p>
-            <a:pPr marL="457200" lvl="0" indent="-312737" algn="l" rtl="0">
+            <a:pPr indent="-312420">
               <a:lnSpc>
                 <a:spcPct val="105000"/>
               </a:lnSpc>
               <a:spcBef>
                 <a:spcPts val="1200"/>
               </a:spcBef>
-              <a:spcAft>
-                <a:spcPts val="0"/>
-              </a:spcAft>
               <a:buSzPts val="1325"/>
-              <a:buChar char="●"/>
             </a:pPr>
             <a:r>
-              <a:rPr lang="es" sz="1325"/>
-              <a:t>Por que facilita conocer a otros usuarios con los mismos intereses.</a:t>
+              <a:rPr lang="es" dirty="0"/>
+              <a:t>Porque facilita conocer a otros usuarios que quieren realizar en grupo la misma actividad deportiva.</a:t>
             </a:r>
-            <a:endParaRPr sz="1325"/>
+            <a:endParaRPr dirty="0"/>
           </a:p>
           <a:p>
-            <a:pPr marL="457200" lvl="0" indent="-312737" algn="l" rtl="0">
+            <a:pPr indent="-312420">
               <a:lnSpc>
                 <a:spcPct val="105000"/>
               </a:lnSpc>
-              <a:spcBef>
-                <a:spcPts val="0"/>
-              </a:spcBef>
-              <a:spcAft>
-                <a:spcPts val="0"/>
-              </a:spcAft>
               <a:buSzPts val="1325"/>
-              <a:buChar char="●"/>
             </a:pPr>
             <a:r>
-              <a:rPr lang="es" sz="1325"/>
-              <a:t>Por facilidad de uso.</a:t>
+              <a:rPr lang="es" dirty="0"/>
+              <a:t>Porque aporta confianza al poder conocer la opinión de otros usuarios sobre las personas (muchas desconocidas) con las que vamos a quedar para realizar la actividad. </a:t>
             </a:r>
-            <a:endParaRPr sz="1325"/>
           </a:p>
           <a:p>
-            <a:pPr marL="457200" lvl="0" indent="-312737" algn="l" rtl="0">
+            <a:pPr indent="-312420">
               <a:lnSpc>
                 <a:spcPct val="105000"/>
               </a:lnSpc>
-              <a:spcBef>
-                <a:spcPts val="0"/>
-              </a:spcBef>
-              <a:spcAft>
-                <a:spcPts val="0"/>
-              </a:spcAft>
               <a:buSzPts val="1325"/>
-              <a:buChar char="●"/>
             </a:pPr>
             <a:r>
-              <a:rPr lang="es" sz="1325"/>
-              <a:t>Porque permite conocer la opinión que tienen otros usuarios sobre las personas (muchos desconocidos) con los que vamos a realizar la práctica deportiva.  </a:t>
+              <a:rPr lang="es" dirty="0"/>
+              <a:t>Por facilidad de uso.</a:t>
             </a:r>
-            <a:endParaRPr sz="1325"/>
           </a:p>
           <a:p>
-            <a:pPr marL="0" lvl="0" indent="0" algn="l" rtl="0">
+            <a:pPr marL="0" lvl="0" indent="0" algn="l">
               <a:lnSpc>
                 <a:spcPct val="105000"/>
               </a:lnSpc>
@@ -10194,13 +10545,13 @@
               <a:buNone/>
             </a:pPr>
             <a:r>
-              <a:rPr lang="es" sz="1325" b="1"/>
+              <a:rPr lang="es" b="1" dirty="0"/>
               <a:t>¿Qué problemas resuelve?</a:t>
             </a:r>
-            <a:endParaRPr sz="1325" b="1"/>
+            <a:endParaRPr b="1" dirty="0"/>
           </a:p>
           <a:p>
-            <a:pPr marL="89999" lvl="0" indent="0" algn="l" rtl="0">
+            <a:pPr marL="89535" lvl="0" indent="0" algn="l" rtl="0">
               <a:lnSpc>
                 <a:spcPct val="105000"/>
               </a:lnSpc>
@@ -10214,10 +10565,10 @@
               <a:buNone/>
             </a:pPr>
             <a:r>
-              <a:rPr lang="es" sz="1325"/>
-              <a:t>La dificultad de encontrar a otras personas con quieran practicar deporte.</a:t>
+              <a:rPr lang="es" dirty="0"/>
+              <a:t>La dificultad de encontrar a otras personas con quien practicar deporte.</a:t>
             </a:r>
-            <a:endParaRPr sz="1325"/>
+            <a:endParaRPr dirty="0"/>
           </a:p>
         </p:txBody>
       </p:sp>
@@ -10281,10 +10632,18 @@
               <a:buNone/>
             </a:pPr>
             <a:r>
-              <a:rPr lang="es"/>
+              <a:rPr lang="es" dirty="0">
+                <a:solidFill>
+                  <a:srgbClr val="000000"/>
+                </a:solidFill>
+              </a:rPr>
               <a:t>Mapa de Empatía (Inscritos)</a:t>
             </a:r>
-            <a:endParaRPr/>
+            <a:endParaRPr lang="es-ES" dirty="0">
+              <a:solidFill>
+                <a:srgbClr val="000000"/>
+              </a:solidFill>
+            </a:endParaRPr>
           </a:p>
         </p:txBody>
       </p:sp>
@@ -10522,10 +10881,18 @@
               <a:buNone/>
             </a:pPr>
             <a:r>
-              <a:rPr lang="es"/>
+              <a:rPr lang="es">
+                <a:solidFill>
+                  <a:srgbClr val="000000"/>
+                </a:solidFill>
+              </a:rPr>
               <a:t>Mapa de Empatía (Creadores de eventos)</a:t>
             </a:r>
-            <a:endParaRPr/>
+            <a:endParaRPr lang="es-ES">
+              <a:solidFill>
+                <a:srgbClr val="000000"/>
+              </a:solidFill>
+            </a:endParaRPr>
           </a:p>
         </p:txBody>
       </p:sp>
@@ -10795,10 +11162,34 @@
               <a:buNone/>
             </a:pPr>
             <a:r>
-              <a:rPr lang="es"/>
-              <a:t>Strategy Document</a:t>
+              <a:rPr lang="es" dirty="0" err="1">
+                <a:solidFill>
+                  <a:srgbClr val="000000"/>
+                </a:solidFill>
+              </a:rPr>
+              <a:t>Strategy</a:t>
             </a:r>
-            <a:endParaRPr/>
+            <a:r>
+              <a:rPr lang="es" dirty="0">
+                <a:solidFill>
+                  <a:srgbClr val="000000"/>
+                </a:solidFill>
+              </a:rPr>
+              <a:t> </a:t>
+            </a:r>
+            <a:r>
+              <a:rPr lang="es" dirty="0" err="1">
+                <a:solidFill>
+                  <a:srgbClr val="000000"/>
+                </a:solidFill>
+              </a:rPr>
+              <a:t>Document</a:t>
+            </a:r>
+            <a:endParaRPr lang="es-ES" dirty="0" err="1">
+              <a:solidFill>
+                <a:srgbClr val="000000"/>
+              </a:solidFill>
+            </a:endParaRPr>
           </a:p>
         </p:txBody>
       </p:sp>
@@ -10814,8 +11205,8 @@
         </p:nvSpPr>
         <p:spPr>
           <a:xfrm>
-            <a:off x="869400" y="1105050"/>
-            <a:ext cx="7505700" cy="3255000"/>
+            <a:off x="822427" y="1143216"/>
+            <a:ext cx="7818851" cy="3420382"/>
           </a:xfrm>
           <a:prstGeom prst="rect">
             <a:avLst/>
@@ -10827,29 +11218,114 @@
           </a:bodyPr>
           <a:lstStyle/>
           <a:p>
-            <a:pPr marL="0" lvl="0" indent="0" algn="l" rtl="0">
+            <a:pPr marL="0" indent="0">
               <a:lnSpc>
-                <a:spcPct val="100000"/>
+                <a:spcPct val="150000"/>
               </a:lnSpc>
-              <a:spcBef>
-                <a:spcPts val="0"/>
-              </a:spcBef>
-              <a:spcAft>
-                <a:spcPts val="0"/>
-              </a:spcAft>
               <a:buNone/>
             </a:pPr>
             <a:r>
-              <a:rPr lang="es" b="1"/>
-              <a:t>Objetivos del usuario generador de eventos:</a:t>
+              <a:rPr lang="es" sz="1600" b="1" dirty="0"/>
+              <a:t>Usuario que quiere realizar actividades deportivas en grupo:</a:t>
             </a:r>
-            <a:endParaRPr b="1"/>
+            <a:endParaRPr lang="es-ES" dirty="0"/>
+          </a:p>
+          <a:p>
+            <a:pPr marL="285750" indent="-285750">
+              <a:lnSpc>
+                <a:spcPct val="150000"/>
+              </a:lnSpc>
+              <a:buFont typeface="Arial"/>
+              <a:buChar char="•"/>
+            </a:pPr>
+            <a:r>
+              <a:rPr lang="es" sz="1400" b="1" dirty="0"/>
+              <a:t>Objetivo: </a:t>
+            </a:r>
+            <a:r>
+              <a:rPr lang="es" sz="1400" dirty="0"/>
+              <a:t>Encontrar con facilidad actividades deportivas en las que poder participar.</a:t>
+            </a:r>
+            <a:endParaRPr lang="en-US" sz="1400" dirty="0"/>
+          </a:p>
+          <a:p>
+            <a:pPr marL="285750" indent="-285750">
+              <a:lnSpc>
+                <a:spcPct val="150000"/>
+              </a:lnSpc>
+              <a:buFont typeface="Arial"/>
+              <a:buChar char="•"/>
+            </a:pPr>
+            <a:r>
+              <a:rPr lang="es" sz="1400" b="1" dirty="0"/>
+              <a:t>Definición: </a:t>
+            </a:r>
+            <a:r>
+              <a:rPr lang="es" sz="1400" dirty="0"/>
+              <a:t>Aficionado al deporte que busca gente con quien practicarlo.</a:t>
+            </a:r>
+            <a:endParaRPr lang="es" sz="1400" b="1" dirty="0"/>
+          </a:p>
+          <a:p>
+            <a:pPr marL="285750" indent="-285750">
+              <a:lnSpc>
+                <a:spcPct val="150000"/>
+              </a:lnSpc>
+              <a:buFont typeface="Arial"/>
+              <a:buChar char="•"/>
+            </a:pPr>
+            <a:endParaRPr lang="es" sz="1600" b="1" dirty="0"/>
+          </a:p>
+          <a:p>
+            <a:pPr marL="0" indent="0">
+              <a:lnSpc>
+                <a:spcPct val="150000"/>
+              </a:lnSpc>
+              <a:buNone/>
+            </a:pPr>
+            <a:r>
+              <a:rPr lang="es" sz="1600" b="1" dirty="0"/>
+              <a:t>Usuario que quiere organizar actividades deportivas:</a:t>
+            </a:r>
+          </a:p>
+          <a:p>
+            <a:pPr marL="285750" indent="-285750">
+              <a:lnSpc>
+                <a:spcPct val="150000"/>
+              </a:lnSpc>
+              <a:buFont typeface="Arial"/>
+              <a:buChar char="•"/>
+            </a:pPr>
+            <a:r>
+              <a:rPr lang="es" sz="1400" b="1" dirty="0"/>
+              <a:t>Objetivo: </a:t>
+            </a:r>
+            <a:r>
+              <a:rPr lang="es" sz="1400" dirty="0"/>
+              <a:t>Organizar y dar a conocer actividades deportivas a usuarios apasionados por el deporte.</a:t>
+            </a:r>
+            <a:endParaRPr sz="1400"/>
+          </a:p>
+          <a:p>
+            <a:pPr marL="285750" indent="-285750">
+              <a:lnSpc>
+                <a:spcPct val="150000"/>
+              </a:lnSpc>
+              <a:buFont typeface="Arial"/>
+              <a:buChar char="•"/>
+            </a:pPr>
+            <a:r>
+              <a:rPr lang="es" sz="1400" b="1" dirty="0"/>
+              <a:t>Definición: </a:t>
+            </a:r>
+            <a:r>
+              <a:rPr lang="es" sz="1400" dirty="0"/>
+              <a:t>Aficionado al deporte que quiere organizar la práctica deportiva y/o, personal que dispone de las instalaciones donde poder organizar las actividades deportivas.</a:t>
+            </a:r>
+            <a:endParaRPr sz="1400" dirty="0"/>
           </a:p>
           <a:p>
             <a:pPr marL="0" lvl="0" indent="0" algn="l" rtl="0">
-              <a:lnSpc>
-                <a:spcPct val="100000"/>
-              </a:lnSpc>
               <a:spcBef>
                 <a:spcPts val="0"/>
               </a:spcBef>
@@ -10858,146 +11334,7 @@
               </a:spcAft>
               <a:buNone/>
             </a:pPr>
-            <a:r>
-              <a:rPr lang="es"/>
-              <a:t>Organizar y dar a conocer eventos deportivos a usuarios apasionados por el deporte.</a:t>
-            </a:r>
-            <a:endParaRPr/>
-          </a:p>
-          <a:p>
-            <a:pPr marL="0" lvl="0" indent="0" algn="l" rtl="0">
-              <a:lnSpc>
-                <a:spcPct val="100000"/>
-              </a:lnSpc>
-              <a:spcBef>
-                <a:spcPts val="0"/>
-              </a:spcBef>
-              <a:spcAft>
-                <a:spcPts val="0"/>
-              </a:spcAft>
-              <a:buNone/>
-            </a:pPr>
-            <a:endParaRPr/>
-          </a:p>
-          <a:p>
-            <a:pPr marL="0" lvl="0" indent="0" algn="l" rtl="0">
-              <a:spcBef>
-                <a:spcPts val="0"/>
-              </a:spcBef>
-              <a:spcAft>
-                <a:spcPts val="0"/>
-              </a:spcAft>
-              <a:buNone/>
-            </a:pPr>
-            <a:r>
-              <a:rPr lang="es" b="1"/>
-              <a:t>Definición del usuario generador de eventos:</a:t>
-            </a:r>
-            <a:endParaRPr b="1"/>
-          </a:p>
-          <a:p>
-            <a:pPr marL="0" lvl="0" indent="0" algn="l" rtl="0">
-              <a:spcBef>
-                <a:spcPts val="0"/>
-              </a:spcBef>
-              <a:spcAft>
-                <a:spcPts val="0"/>
-              </a:spcAft>
-              <a:buNone/>
-            </a:pPr>
-            <a:r>
-              <a:rPr lang="es"/>
-              <a:t>Aficionado al deporte que quiere organizar la práctica deportiva y/o, personal que dispone de las instalaciones donde poder organizar las actividades deportivas.</a:t>
-            </a:r>
-            <a:endParaRPr/>
-          </a:p>
-          <a:p>
-            <a:pPr marL="0" lvl="0" indent="0" algn="l" rtl="0">
-              <a:spcBef>
-                <a:spcPts val="0"/>
-              </a:spcBef>
-              <a:spcAft>
-                <a:spcPts val="0"/>
-              </a:spcAft>
-              <a:buNone/>
-            </a:pPr>
-            <a:endParaRPr/>
-          </a:p>
-          <a:p>
-            <a:pPr marL="0" lvl="0" indent="0" algn="l" rtl="0">
-              <a:spcBef>
-                <a:spcPts val="0"/>
-              </a:spcBef>
-              <a:spcAft>
-                <a:spcPts val="0"/>
-              </a:spcAft>
-              <a:buNone/>
-            </a:pPr>
-            <a:r>
-              <a:rPr lang="es" b="1"/>
-              <a:t>Objetivos del usuario que busca eventos:</a:t>
-            </a:r>
-            <a:endParaRPr b="1"/>
-          </a:p>
-          <a:p>
-            <a:pPr marL="0" lvl="0" indent="0" algn="l" rtl="0">
-              <a:spcBef>
-                <a:spcPts val="0"/>
-              </a:spcBef>
-              <a:spcAft>
-                <a:spcPts val="0"/>
-              </a:spcAft>
-              <a:buNone/>
-            </a:pPr>
-            <a:r>
-              <a:rPr lang="es"/>
-              <a:t>Encontrar con facilidad eventos deportivos en los que poder participar.</a:t>
-            </a:r>
-            <a:endParaRPr/>
-          </a:p>
-          <a:p>
-            <a:pPr marL="0" lvl="0" indent="0" algn="l" rtl="0">
-              <a:spcBef>
-                <a:spcPts val="0"/>
-              </a:spcBef>
-              <a:spcAft>
-                <a:spcPts val="0"/>
-              </a:spcAft>
-              <a:buNone/>
-            </a:pPr>
-            <a:endParaRPr/>
-          </a:p>
-          <a:p>
-            <a:pPr marL="0" lvl="0" indent="0" algn="l" rtl="0">
-              <a:spcBef>
-                <a:spcPts val="0"/>
-              </a:spcBef>
-              <a:spcAft>
-                <a:spcPts val="0"/>
-              </a:spcAft>
-              <a:buNone/>
-            </a:pPr>
-            <a:r>
-              <a:rPr lang="es" b="1"/>
-              <a:t>Definición del usuario que busca eventos:</a:t>
-            </a:r>
-            <a:endParaRPr b="1"/>
-          </a:p>
-          <a:p>
-            <a:pPr marL="0" lvl="0" indent="0" algn="l" rtl="0">
-              <a:spcBef>
-                <a:spcPts val="0"/>
-              </a:spcBef>
-              <a:spcAft>
-                <a:spcPts val="0"/>
-              </a:spcAft>
-              <a:buNone/>
-            </a:pPr>
-            <a:r>
-              <a:rPr lang="es"/>
-              <a:t>Aficionado al deporte que busca gente con quien practicarlo.</a:t>
-            </a:r>
-            <a:endParaRPr/>
+            <a:endParaRPr lang="es" b="1" dirty="0"/>
           </a:p>
         </p:txBody>
       </p:sp>
@@ -11051,21 +11388,41 @@
           </a:bodyPr>
           <a:lstStyle/>
           <a:p>
-            <a:pPr marL="0" lvl="0" indent="0" algn="ctr" rtl="0">
-              <a:spcBef>
-                <a:spcPts val="0"/>
-              </a:spcBef>
-              <a:spcAft>
-                <a:spcPts val="0"/>
-              </a:spcAft>
+            <a:pPr algn="ctr">
               <a:buSzPts val="990"/>
-              <a:buNone/>
             </a:pPr>
             <a:r>
-              <a:rPr lang="es" sz="2300"/>
-              <a:t>Journey Map: Búsqueda de personas con quien practicar deporte</a:t>
+              <a:rPr lang="es" sz="2300" dirty="0" err="1">
+                <a:solidFill>
+                  <a:srgbClr val="000000"/>
+                </a:solidFill>
+              </a:rPr>
+              <a:t>Journey</a:t>
             </a:r>
-            <a:endParaRPr sz="2300"/>
+            <a:r>
+              <a:rPr lang="es" sz="2300" dirty="0">
+                <a:solidFill>
+                  <a:srgbClr val="000000"/>
+                </a:solidFill>
+              </a:rPr>
+              <a:t> </a:t>
+            </a:r>
+            <a:r>
+              <a:rPr lang="es" sz="2300" dirty="0" err="1">
+                <a:solidFill>
+                  <a:srgbClr val="000000"/>
+                </a:solidFill>
+              </a:rPr>
+              <a:t>Map</a:t>
+            </a:r>
+            <a:r>
+              <a:rPr lang="es" sz="2300" dirty="0">
+                <a:solidFill>
+                  <a:srgbClr val="000000"/>
+                </a:solidFill>
+              </a:rPr>
+              <a:t>: Búsqueda Actividad Deportiva</a:t>
+            </a:r>
           </a:p>
         </p:txBody>
       </p:sp>
@@ -11073,11 +11430,17 @@
         <p:nvGraphicFramePr>
           <p:cNvPr id="165" name="Google Shape;165;p19"/>
           <p:cNvGraphicFramePr/>
-          <p:nvPr/>
+          <p:nvPr>
+            <p:extLst>
+              <p:ext uri="{D42A27DB-BD31-4B8C-83A1-F6EECF244321}">
+                <p14:modId xmlns:p14="http://schemas.microsoft.com/office/powerpoint/2010/main" val="2461296171"/>
+              </p:ext>
+            </p:extLst>
+          </p:nvPr>
         </p:nvGraphicFramePr>
         <p:xfrm>
           <a:off x="203175" y="853800"/>
-          <a:ext cx="8737650" cy="4084345"/>
+          <a:ext cx="8751027" cy="4045365"/>
         </p:xfrm>
         <a:graphic>
           <a:graphicData uri="http://schemas.openxmlformats.org/drawingml/2006/table">
@@ -11087,56 +11450,56 @@
                 <a:tableStyleId>{7D1EFDEC-BACA-459D-A49C-83122E7706D0}</a:tableStyleId>
               </a:tblPr>
               <a:tblGrid>
-                <a:gridCol w="1038675">
+                <a:gridCol w="1030243">
                   <a:extLst>
                     <a:ext uri="{9D8B030D-6E8A-4147-A177-3AD203B41FA5}">
                       <a16:colId xmlns:a16="http://schemas.microsoft.com/office/drawing/2014/main" val="20000"/>
                     </a:ext>
                   </a:extLst>
                 </a:gridCol>
-                <a:gridCol w="1093350">
+                <a:gridCol w="1084473">
                   <a:extLst>
                     <a:ext uri="{9D8B030D-6E8A-4147-A177-3AD203B41FA5}">
                       <a16:colId xmlns:a16="http://schemas.microsoft.com/office/drawing/2014/main" val="20001"/>
                     </a:ext>
                   </a:extLst>
                 </a:gridCol>
-                <a:gridCol w="1093350">
+                <a:gridCol w="1084473">
                   <a:extLst>
                     <a:ext uri="{9D8B030D-6E8A-4147-A177-3AD203B41FA5}">
                       <a16:colId xmlns:a16="http://schemas.microsoft.com/office/drawing/2014/main" val="20002"/>
                     </a:ext>
                   </a:extLst>
                 </a:gridCol>
-                <a:gridCol w="1093350">
+                <a:gridCol w="1027434">
                   <a:extLst>
                     <a:ext uri="{9D8B030D-6E8A-4147-A177-3AD203B41FA5}">
                       <a16:colId xmlns:a16="http://schemas.microsoft.com/office/drawing/2014/main" val="20003"/>
                     </a:ext>
                   </a:extLst>
                 </a:gridCol>
-                <a:gridCol w="1102450">
+                <a:gridCol w="1150539">
                   <a:extLst>
                     <a:ext uri="{9D8B030D-6E8A-4147-A177-3AD203B41FA5}">
                       <a16:colId xmlns:a16="http://schemas.microsoft.com/office/drawing/2014/main" val="20004"/>
                     </a:ext>
                   </a:extLst>
                 </a:gridCol>
-                <a:gridCol w="1102450">
+                <a:gridCol w="1093500">
                   <a:extLst>
                     <a:ext uri="{9D8B030D-6E8A-4147-A177-3AD203B41FA5}">
                       <a16:colId xmlns:a16="http://schemas.microsoft.com/office/drawing/2014/main" val="20005"/>
                     </a:ext>
                   </a:extLst>
                 </a:gridCol>
-                <a:gridCol w="1102450">
+                <a:gridCol w="1223367">
                   <a:extLst>
                     <a:ext uri="{9D8B030D-6E8A-4147-A177-3AD203B41FA5}">
                       <a16:colId xmlns:a16="http://schemas.microsoft.com/office/drawing/2014/main" val="20006"/>
                     </a:ext>
                   </a:extLst>
                 </a:gridCol>
-                <a:gridCol w="1111575">
+                <a:gridCol w="1056998">
                   <a:extLst>
                     <a:ext uri="{9D8B030D-6E8A-4147-A177-3AD203B41FA5}">
                       <a16:colId xmlns:a16="http://schemas.microsoft.com/office/drawing/2014/main" val="20007"/>
@@ -11144,7 +11507,7 @@
                   </a:extLst>
                 </a:gridCol>
               </a:tblGrid>
-              <a:tr h="228600">
+              <a:tr h="272031">
                 <a:tc>
                   <a:txBody>
                     <a:bodyPr/>
@@ -11163,7 +11526,7 @@
                         <a:buNone/>
                       </a:pPr>
                       <a:r>
-                        <a:rPr lang="es" sz="800" b="1">
+                        <a:rPr lang="es" sz="1000" b="1" dirty="0">
                           <a:latin typeface="Calibri"/>
                           <a:ea typeface="Calibri"/>
                           <a:cs typeface="Calibri"/>
@@ -11171,7 +11534,7 @@
                         </a:rPr>
                         <a:t>ETAPAS</a:t>
                       </a:r>
-                      <a:endParaRPr sz="800" b="1">
+                      <a:endParaRPr sz="1000" b="1">
                         <a:latin typeface="Calibri"/>
                         <a:ea typeface="Calibri"/>
                         <a:cs typeface="Calibri"/>
@@ -11236,7 +11599,7 @@
                         <a:buNone/>
                       </a:pPr>
                       <a:r>
-                        <a:rPr lang="es" sz="800" b="1">
+                        <a:rPr lang="es" sz="1000" b="1" dirty="0">
                           <a:latin typeface="Calibri"/>
                           <a:ea typeface="Calibri"/>
                           <a:cs typeface="Calibri"/>
@@ -11244,7 +11607,7 @@
                         </a:rPr>
                         <a:t>ETAPA 1</a:t>
                       </a:r>
-                      <a:endParaRPr sz="800" b="1">
+                      <a:endParaRPr sz="1000" b="1">
                         <a:latin typeface="Calibri"/>
                         <a:ea typeface="Calibri"/>
                         <a:cs typeface="Calibri"/>
@@ -11309,7 +11672,7 @@
                         <a:buNone/>
                       </a:pPr>
                       <a:r>
-                        <a:rPr lang="es" sz="800" b="1">
+                        <a:rPr lang="es" sz="1000" b="1" dirty="0">
                           <a:latin typeface="Calibri"/>
                           <a:ea typeface="Calibri"/>
                           <a:cs typeface="Calibri"/>
@@ -11317,7 +11680,7 @@
                         </a:rPr>
                         <a:t>ETAPA 2</a:t>
                       </a:r>
-                      <a:endParaRPr sz="800" b="1">
+                      <a:endParaRPr sz="1000" b="1">
                         <a:latin typeface="Calibri"/>
                         <a:ea typeface="Calibri"/>
                         <a:cs typeface="Calibri"/>
@@ -11382,7 +11745,7 @@
                         <a:buNone/>
                       </a:pPr>
                       <a:r>
-                        <a:rPr lang="es" sz="800" b="1">
+                        <a:rPr lang="es" sz="1000" b="1" dirty="0">
                           <a:latin typeface="Calibri"/>
                           <a:ea typeface="Calibri"/>
                           <a:cs typeface="Calibri"/>
@@ -11390,7 +11753,7 @@
                         </a:rPr>
                         <a:t>ETAPA 3</a:t>
                       </a:r>
-                      <a:endParaRPr sz="800" b="1">
+                      <a:endParaRPr sz="1000" b="1">
                         <a:latin typeface="Calibri"/>
                         <a:ea typeface="Calibri"/>
                         <a:cs typeface="Calibri"/>
@@ -11455,7 +11818,7 @@
                         <a:buNone/>
                       </a:pPr>
                       <a:r>
-                        <a:rPr lang="es" sz="800" b="1">
+                        <a:rPr lang="es" sz="1000" b="1" dirty="0">
                           <a:latin typeface="Calibri"/>
                           <a:ea typeface="Calibri"/>
                           <a:cs typeface="Calibri"/>
@@ -11463,7 +11826,7 @@
                         </a:rPr>
                         <a:t>ETAPA 4</a:t>
                       </a:r>
-                      <a:endParaRPr sz="800" b="1">
+                      <a:endParaRPr sz="1000" b="1">
                         <a:latin typeface="Calibri"/>
                         <a:ea typeface="Calibri"/>
                         <a:cs typeface="Calibri"/>
@@ -11528,7 +11891,7 @@
                         <a:buNone/>
                       </a:pPr>
                       <a:r>
-                        <a:rPr lang="es" sz="800" b="1">
+                        <a:rPr lang="es" sz="1000" b="1" dirty="0">
                           <a:latin typeface="Calibri"/>
                           <a:ea typeface="Calibri"/>
                           <a:cs typeface="Calibri"/>
@@ -11536,7 +11899,7 @@
                         </a:rPr>
                         <a:t>ETAPA 5</a:t>
                       </a:r>
-                      <a:endParaRPr sz="800" b="1">
+                      <a:endParaRPr sz="1000" b="1">
                         <a:latin typeface="Calibri"/>
                         <a:ea typeface="Calibri"/>
                         <a:cs typeface="Calibri"/>
@@ -11601,7 +11964,7 @@
                         <a:buNone/>
                       </a:pPr>
                       <a:r>
-                        <a:rPr lang="es" sz="800" b="1">
+                        <a:rPr lang="es" sz="1000" b="1" dirty="0">
                           <a:latin typeface="Calibri"/>
                           <a:ea typeface="Calibri"/>
                           <a:cs typeface="Calibri"/>
@@ -11609,7 +11972,7 @@
                         </a:rPr>
                         <a:t>ETAPA 6</a:t>
                       </a:r>
-                      <a:endParaRPr sz="800" b="1">
+                      <a:endParaRPr sz="1000" b="1">
                         <a:latin typeface="Calibri"/>
                         <a:ea typeface="Calibri"/>
                         <a:cs typeface="Calibri"/>
@@ -11674,7 +12037,7 @@
                         <a:buNone/>
                       </a:pPr>
                       <a:r>
-                        <a:rPr lang="es" sz="800" b="1">
+                        <a:rPr lang="es" sz="1000" b="1" dirty="0">
                           <a:latin typeface="Calibri"/>
                           <a:ea typeface="Calibri"/>
                           <a:cs typeface="Calibri"/>
@@ -11682,7 +12045,7 @@
                         </a:rPr>
                         <a:t>ETAPA 7</a:t>
                       </a:r>
-                      <a:endParaRPr sz="800" b="1">
+                      <a:endParaRPr sz="1000" b="1">
                         <a:latin typeface="Calibri"/>
                         <a:ea typeface="Calibri"/>
                         <a:cs typeface="Calibri"/>
@@ -11735,7 +12098,7 @@
                   </a:ext>
                 </a:extLst>
               </a:tr>
-              <a:tr h="953850">
+              <a:tr h="938947">
                 <a:tc>
                   <a:txBody>
                     <a:bodyPr/>
@@ -11754,7 +12117,7 @@
                         <a:buNone/>
                       </a:pPr>
                       <a:r>
-                        <a:rPr lang="es" sz="800" b="1">
+                        <a:rPr lang="es" sz="1000" b="1" dirty="0">
                           <a:latin typeface="Calibri"/>
                           <a:ea typeface="Calibri"/>
                           <a:cs typeface="Calibri"/>
@@ -11762,7 +12125,7 @@
                         </a:rPr>
                         <a:t>OBJETIVOS DEL USUARIO</a:t>
                       </a:r>
-                      <a:endParaRPr sz="800" b="1">
+                      <a:endParaRPr sz="1000" b="1">
                         <a:latin typeface="Calibri"/>
                         <a:ea typeface="Calibri"/>
                         <a:cs typeface="Calibri"/>
@@ -11827,15 +12190,23 @@
                         <a:buNone/>
                       </a:pPr>
                       <a:r>
-                        <a:rPr lang="es" sz="800">
+                        <a:rPr lang="es" sz="800" dirty="0">
                           <a:latin typeface="Calibri"/>
                           <a:ea typeface="Calibri"/>
                           <a:cs typeface="Calibri"/>
                           <a:sym typeface="Calibri"/>
                         </a:rPr>
-                        <a:t>Practicar deporte en compañía</a:t>
+                        <a:t>Practicar deporte en </a:t>
                       </a:r>
-                      <a:endParaRPr sz="800">
+                      <a:r>
+                        <a:rPr lang="es" sz="800" dirty="0">
+                          <a:latin typeface="Calibri"/>
+                          <a:ea typeface="Calibri"/>
+                          <a:cs typeface="Calibri"/>
+                        </a:rPr>
+                        <a:t>grupo</a:t>
+                      </a:r>
+                      <a:endParaRPr sz="800" dirty="0">
                         <a:latin typeface="Calibri"/>
                         <a:ea typeface="Calibri"/>
                         <a:cs typeface="Calibri"/>
@@ -11900,7 +12271,7 @@
                         <a:buNone/>
                       </a:pPr>
                       <a:r>
-                        <a:rPr lang="es" sz="800">
+                        <a:rPr lang="es" sz="800" dirty="0">
                           <a:latin typeface="Calibri"/>
                           <a:ea typeface="Calibri"/>
                           <a:cs typeface="Calibri"/>
@@ -11908,7 +12279,7 @@
                         </a:rPr>
                         <a:t>Encontrar a otros deportistas con quien practicar una actividad deportiva concreta en una ubicación y fecha determinada</a:t>
                       </a:r>
-                      <a:endParaRPr sz="800">
+                      <a:endParaRPr sz="800" dirty="0">
                         <a:latin typeface="Calibri"/>
                         <a:ea typeface="Calibri"/>
                         <a:cs typeface="Calibri"/>
@@ -11973,7 +12344,7 @@
                         <a:buNone/>
                       </a:pPr>
                       <a:r>
-                        <a:rPr lang="es" sz="800">
+                        <a:rPr lang="es" sz="800" dirty="0">
                           <a:latin typeface="Calibri"/>
                           <a:ea typeface="Calibri"/>
                           <a:cs typeface="Calibri"/>
@@ -11981,7 +12352,7 @@
                         </a:rPr>
                         <a:t>Conocer los requisitos exigidos para practicar la actividad deportiva.</a:t>
                       </a:r>
-                      <a:endParaRPr sz="800">
+                      <a:endParaRPr sz="800" dirty="0">
                         <a:latin typeface="Calibri"/>
                         <a:ea typeface="Calibri"/>
                         <a:cs typeface="Calibri"/>
@@ -12046,7 +12417,7 @@
                         <a:buNone/>
                       </a:pPr>
                       <a:r>
-                        <a:rPr lang="es" sz="800">
+                        <a:rPr lang="es" sz="800" dirty="0">
                           <a:latin typeface="Calibri"/>
                           <a:ea typeface="Calibri"/>
                           <a:cs typeface="Calibri"/>
@@ -12054,7 +12425,7 @@
                         </a:rPr>
                         <a:t>Antes de quedar con desconocidos para hacer deporte, le gustaría tener referencias de esas personas.</a:t>
                       </a:r>
-                      <a:endParaRPr sz="800">
+                      <a:endParaRPr sz="800" dirty="0">
                         <a:latin typeface="Calibri"/>
                         <a:ea typeface="Calibri"/>
                         <a:cs typeface="Calibri"/>
@@ -12119,7 +12490,7 @@
                         <a:buNone/>
                       </a:pPr>
                       <a:r>
-                        <a:rPr lang="es" sz="800">
+                        <a:rPr lang="es" sz="800" dirty="0">
                           <a:latin typeface="Calibri"/>
                           <a:ea typeface="Calibri"/>
                           <a:cs typeface="Calibri"/>
@@ -12127,7 +12498,7 @@
                         </a:rPr>
                         <a:t>Contactar con las personas interesadas en compartir la práctica deportiva, sin facilitar información personal (teléfono, etc.).</a:t>
                       </a:r>
-                      <a:endParaRPr sz="800">
+                      <a:endParaRPr sz="800" dirty="0">
                         <a:latin typeface="Calibri"/>
                         <a:ea typeface="Calibri"/>
                         <a:cs typeface="Calibri"/>
@@ -12192,7 +12563,7 @@
                         <a:buNone/>
                       </a:pPr>
                       <a:r>
-                        <a:rPr lang="es" sz="800">
+                        <a:rPr lang="es" sz="800" dirty="0">
                           <a:latin typeface="Calibri"/>
                           <a:ea typeface="Calibri"/>
                           <a:cs typeface="Calibri"/>
@@ -12200,7 +12571,7 @@
                         </a:rPr>
                         <a:t>Tener constancia de que la actividad deportiva se va a realizar, y de que ha sido admitido en la misma.</a:t>
                       </a:r>
-                      <a:endParaRPr sz="800">
+                      <a:endParaRPr sz="800" dirty="0">
                         <a:latin typeface="Calibri"/>
                         <a:ea typeface="Calibri"/>
                         <a:cs typeface="Calibri"/>
@@ -12221,15 +12592,23 @@
                         <a:buNone/>
                       </a:pPr>
                       <a:r>
-                        <a:rPr lang="es" sz="800">
+                        <a:rPr lang="es" sz="800" dirty="0">
+                          <a:latin typeface="Calibri"/>
+                          <a:ea typeface="Calibri"/>
+                          <a:cs typeface="Calibri"/>
+                        </a:rPr>
+                        <a:t> </a:t>
+                      </a:r>
+                      <a:r>
+                        <a:rPr lang="es" sz="800" dirty="0">
                           <a:latin typeface="Calibri"/>
                           <a:ea typeface="Calibri"/>
                           <a:cs typeface="Calibri"/>
                           <a:sym typeface="Calibri"/>
                         </a:rPr>
-                        <a:t> ¡Tengo plaza!</a:t>
+                        <a:t>¡Tengo plaza!</a:t>
                       </a:r>
-                      <a:endParaRPr sz="800">
+                      <a:endParaRPr sz="800" dirty="0">
                         <a:latin typeface="Calibri"/>
                         <a:ea typeface="Calibri"/>
                         <a:cs typeface="Calibri"/>
@@ -12294,7 +12673,7 @@
                         <a:buNone/>
                       </a:pPr>
                       <a:r>
-                        <a:rPr lang="es" sz="800">
+                        <a:rPr lang="es" sz="800" dirty="0">
                           <a:latin typeface="Calibri"/>
                           <a:ea typeface="Calibri"/>
                           <a:cs typeface="Calibri"/>
@@ -12302,7 +12681,7 @@
                         </a:rPr>
                         <a:t>Tras la participación en una actividad deportiva, le gustaría poder dar su opinión sobre los participantes y organizadores.</a:t>
                       </a:r>
-                      <a:endParaRPr sz="800">
+                      <a:endParaRPr sz="800" dirty="0">
                         <a:latin typeface="Calibri"/>
                         <a:ea typeface="Calibri"/>
                         <a:cs typeface="Calibri"/>
@@ -12355,7 +12734,7 @@
                   </a:ext>
                 </a:extLst>
               </a:tr>
-              <a:tr h="253200">
+              <a:tr h="272031">
                 <a:tc>
                   <a:txBody>
                     <a:bodyPr/>
@@ -12374,15 +12753,23 @@
                         <a:buNone/>
                       </a:pPr>
                       <a:r>
-                        <a:rPr lang="es" sz="800" b="1">
+                        <a:rPr lang="es" sz="1000" b="1" dirty="0">
+                          <a:latin typeface="Calibri"/>
+                          <a:ea typeface="Calibri"/>
+                          <a:cs typeface="Calibri"/>
+                        </a:rPr>
+                        <a:t>DETA.</a:t>
+                      </a:r>
+                      <a:r>
+                        <a:rPr lang="es" sz="1000" b="1" dirty="0">
                           <a:latin typeface="Calibri"/>
                           <a:ea typeface="Calibri"/>
                           <a:cs typeface="Calibri"/>
                           <a:sym typeface="Calibri"/>
                         </a:rPr>
-                        <a:t>DETALLES / ENTORNO</a:t>
+                        <a:t> / ENTORNO</a:t>
                       </a:r>
-                      <a:endParaRPr sz="800" b="1">
+                      <a:endParaRPr sz="1000" b="1">
                         <a:latin typeface="Calibri"/>
                         <a:ea typeface="Calibri"/>
                         <a:cs typeface="Calibri"/>
@@ -12827,7 +13214,7 @@
                   </a:ext>
                 </a:extLst>
               </a:tr>
-              <a:tr h="764375">
+              <a:tr h="798542">
                 <a:tc>
                   <a:txBody>
                     <a:bodyPr/>
@@ -12846,15 +13233,51 @@
                         <a:buNone/>
                       </a:pPr>
                       <a:r>
-                        <a:rPr lang="es" sz="800" b="1">
+                        <a:rPr lang="es" sz="1000" b="1" dirty="0">
                           <a:latin typeface="Calibri"/>
                           <a:ea typeface="Calibri"/>
                           <a:cs typeface="Calibri"/>
                           <a:sym typeface="Calibri"/>
                         </a:rPr>
-                        <a:t>PENSAMIENTOS DE USUARIO</a:t>
+                        <a:t>PENSAMIENTOS </a:t>
                       </a:r>
-                      <a:endParaRPr sz="800" b="1">
+                      <a:endParaRPr lang="es-ES" sz="1000" b="1">
+                        <a:latin typeface="Calibri"/>
+                        <a:ea typeface="Calibri"/>
+                        <a:cs typeface="Calibri"/>
+                      </a:endParaRPr>
+                    </a:p>
+                    <a:p>
+                      <a:pPr marL="0" lvl="0" indent="0" algn="ctr">
+                        <a:lnSpc>
+                          <a:spcPct val="114999"/>
+                        </a:lnSpc>
+                        <a:spcBef>
+                          <a:spcPts val="0"/>
+                        </a:spcBef>
+                        <a:spcAft>
+                          <a:spcPts val="0"/>
+                        </a:spcAft>
+                        <a:buNone/>
+                      </a:pPr>
+                      <a:r>
+                        <a:rPr lang="es" sz="1000" b="1" dirty="0">
+                          <a:latin typeface="Calibri"/>
+                          <a:ea typeface="Calibri"/>
+                          <a:cs typeface="Calibri"/>
+                        </a:rPr>
+                        <a:t>DEL</a:t>
+                      </a:r>
+                      <a:r>
+                        <a:rPr lang="es" sz="1000" b="1" dirty="0">
+                          <a:latin typeface="Calibri"/>
+                          <a:ea typeface="Calibri"/>
+                          <a:cs typeface="Calibri"/>
+                          <a:sym typeface="Calibri"/>
+                        </a:rPr>
+                        <a:t> USUARIO</a:t>
+                      </a:r>
+                      <a:endParaRPr sz="1000" b="1" dirty="0">
                         <a:latin typeface="Calibri"/>
                         <a:ea typeface="Calibri"/>
                         <a:cs typeface="Calibri"/>
@@ -12919,7 +13342,7 @@
                         <a:buNone/>
                       </a:pPr>
                       <a:r>
-                        <a:rPr lang="es" sz="800">
+                        <a:rPr lang="es" sz="800" dirty="0">
                           <a:latin typeface="Calibri"/>
                           <a:ea typeface="Calibri"/>
                           <a:cs typeface="Calibri"/>
@@ -12927,7 +13350,7 @@
                         </a:rPr>
                         <a:t>No conozco a nadie con quien practicar deporte. O necesito a más gente para jugar a un deporte de equipo</a:t>
                       </a:r>
-                      <a:endParaRPr sz="800">
+                      <a:endParaRPr sz="800" dirty="0">
                         <a:latin typeface="Calibri"/>
                         <a:ea typeface="Calibri"/>
                         <a:cs typeface="Calibri"/>
@@ -12992,15 +13415,23 @@
                         <a:buNone/>
                       </a:pPr>
                       <a:r>
-                        <a:rPr lang="es" sz="800">
+                        <a:rPr lang="es" sz="800" dirty="0">
+                          <a:latin typeface="Calibri"/>
+                          <a:ea typeface="Calibri"/>
+                          <a:cs typeface="Calibri"/>
+                        </a:rPr>
+                        <a:t> </a:t>
+                      </a:r>
+                      <a:r>
+                        <a:rPr lang="es" sz="800" dirty="0">
                           <a:latin typeface="Calibri"/>
                           <a:ea typeface="Calibri"/>
                           <a:cs typeface="Calibri"/>
                           <a:sym typeface="Calibri"/>
                         </a:rPr>
-                        <a:t> ¿Como encuentro a otras personas con quien practicar deporte?</a:t>
+                        <a:t>¿Como encuentro a otras personas con quien practicar deporte?</a:t>
                       </a:r>
-                      <a:endParaRPr sz="800">
+                      <a:endParaRPr sz="800" dirty="0">
                         <a:latin typeface="Calibri"/>
                         <a:ea typeface="Calibri"/>
                         <a:cs typeface="Calibri"/>
@@ -13065,7 +13496,7 @@
                         <a:buNone/>
                       </a:pPr>
                       <a:r>
-                        <a:rPr lang="es" sz="800">
+                        <a:rPr lang="es" sz="800" dirty="0">
                           <a:latin typeface="Calibri"/>
                           <a:ea typeface="Calibri"/>
                           <a:cs typeface="Calibri"/>
@@ -13073,7 +13504,7 @@
                         </a:rPr>
                         <a:t>¿Hay que cumplir algún requisito para participar en la actividad deportiva?</a:t>
                       </a:r>
-                      <a:endParaRPr sz="800">
+                      <a:endParaRPr sz="800" dirty="0">
                         <a:latin typeface="Calibri"/>
                         <a:ea typeface="Calibri"/>
                         <a:cs typeface="Calibri"/>
@@ -13138,7 +13569,7 @@
                         <a:buNone/>
                       </a:pPr>
                       <a:r>
-                        <a:rPr lang="es" sz="800">
+                        <a:rPr lang="es" sz="800" dirty="0">
                           <a:latin typeface="Calibri"/>
                           <a:ea typeface="Calibri"/>
                           <a:cs typeface="Calibri"/>
@@ -13146,7 +13577,7 @@
                         </a:rPr>
                         <a:t>La mayoría de esas personas son desconocidas ¿Es gente maja?</a:t>
                       </a:r>
-                      <a:endParaRPr sz="800">
+                      <a:endParaRPr sz="800" dirty="0">
                         <a:latin typeface="Calibri"/>
                         <a:ea typeface="Calibri"/>
                         <a:cs typeface="Calibri"/>
@@ -13211,7 +13642,7 @@
                         <a:buNone/>
                       </a:pPr>
                       <a:r>
-                        <a:rPr lang="es" sz="800">
+                        <a:rPr lang="es" sz="800" dirty="0">
                           <a:latin typeface="Calibri"/>
                           <a:ea typeface="Calibri"/>
                           <a:cs typeface="Calibri"/>
@@ -13219,7 +13650,7 @@
                         </a:rPr>
                         <a:t>¿Cómo contacto con esas personas sin facilitarles mis datos personales de contacto?</a:t>
                       </a:r>
-                      <a:endParaRPr sz="800">
+                      <a:endParaRPr sz="800" dirty="0">
                         <a:latin typeface="Calibri"/>
                         <a:ea typeface="Calibri"/>
                         <a:cs typeface="Calibri"/>
@@ -13284,7 +13715,7 @@
                         <a:buNone/>
                       </a:pPr>
                       <a:r>
-                        <a:rPr lang="es" sz="800">
+                        <a:rPr lang="es" sz="800" dirty="0">
                           <a:latin typeface="Calibri"/>
                           <a:ea typeface="Calibri"/>
                           <a:cs typeface="Calibri"/>
@@ -13292,7 +13723,7 @@
                         </a:rPr>
                         <a:t>¿Cómo sé si tengo plaza en la actividad o, si esta se va a realizar?</a:t>
                       </a:r>
-                      <a:endParaRPr sz="800">
+                      <a:endParaRPr sz="800" dirty="0">
                         <a:latin typeface="Calibri"/>
                         <a:ea typeface="Calibri"/>
                         <a:cs typeface="Calibri"/>
@@ -13357,7 +13788,7 @@
                         <a:buNone/>
                       </a:pPr>
                       <a:r>
-                        <a:rPr lang="es" sz="800">
+                        <a:rPr lang="es" sz="800" dirty="0">
                           <a:latin typeface="Calibri"/>
                           <a:ea typeface="Calibri"/>
                           <a:cs typeface="Calibri"/>
@@ -13365,7 +13796,7 @@
                         </a:rPr>
                         <a:t>¡¡Esta app es fantástica!!</a:t>
                       </a:r>
-                      <a:endParaRPr sz="800">
+                      <a:endParaRPr sz="800" dirty="0">
                         <a:latin typeface="Calibri"/>
                         <a:ea typeface="Calibri"/>
                         <a:cs typeface="Calibri"/>
@@ -13418,7 +13849,7 @@
                   </a:ext>
                 </a:extLst>
               </a:tr>
-              <a:tr h="340300">
+              <a:tr h="333457">
                 <a:tc>
                   <a:txBody>
                     <a:bodyPr/>
@@ -13437,7 +13868,7 @@
                         <a:buNone/>
                       </a:pPr>
                       <a:r>
-                        <a:rPr lang="es" sz="800" b="1">
+                        <a:rPr lang="es" sz="1000" b="1" dirty="0">
                           <a:latin typeface="Calibri"/>
                           <a:ea typeface="Calibri"/>
                           <a:cs typeface="Calibri"/>
@@ -13445,7 +13876,7 @@
                         </a:rPr>
                         <a:t>EMOCIONES</a:t>
                       </a:r>
-                      <a:endParaRPr sz="800" b="1">
+                      <a:endParaRPr sz="1000" b="1">
                         <a:latin typeface="Calibri"/>
                         <a:ea typeface="Calibri"/>
                         <a:cs typeface="Calibri"/>
@@ -13510,7 +13941,7 @@
                         <a:buNone/>
                       </a:pPr>
                       <a:r>
-                        <a:rPr lang="es" sz="800">
+                        <a:rPr lang="es" sz="800" dirty="0">
                           <a:latin typeface="Calibri"/>
                           <a:ea typeface="Calibri"/>
                           <a:cs typeface="Calibri"/>
@@ -13518,7 +13949,7 @@
                         </a:rPr>
                         <a:t>muy triste</a:t>
                       </a:r>
-                      <a:endParaRPr sz="800">
+                      <a:endParaRPr sz="800" dirty="0">
                         <a:latin typeface="Calibri"/>
                         <a:ea typeface="Calibri"/>
                         <a:cs typeface="Calibri"/>
@@ -13583,7 +14014,7 @@
                         <a:buNone/>
                       </a:pPr>
                       <a:r>
-                        <a:rPr lang="es" sz="800">
+                        <a:rPr lang="es" sz="800" dirty="0">
                           <a:latin typeface="Calibri"/>
                           <a:ea typeface="Calibri"/>
                           <a:cs typeface="Calibri"/>
@@ -13591,7 +14022,7 @@
                         </a:rPr>
                         <a:t>triste</a:t>
                       </a:r>
-                      <a:endParaRPr sz="800">
+                      <a:endParaRPr sz="800" dirty="0">
                         <a:latin typeface="Calibri"/>
                         <a:ea typeface="Calibri"/>
                         <a:cs typeface="Calibri"/>
@@ -13656,7 +14087,7 @@
                         <a:buNone/>
                       </a:pPr>
                       <a:r>
-                        <a:rPr lang="es" sz="800">
+                        <a:rPr lang="es" sz="800" dirty="0">
                           <a:latin typeface="Calibri"/>
                           <a:ea typeface="Calibri"/>
                           <a:cs typeface="Calibri"/>
@@ -13664,7 +14095,7 @@
                         </a:rPr>
                         <a:t>muy serio</a:t>
                       </a:r>
-                      <a:endParaRPr sz="800">
+                      <a:endParaRPr sz="800" dirty="0">
                         <a:latin typeface="Calibri"/>
                         <a:ea typeface="Calibri"/>
                         <a:cs typeface="Calibri"/>
@@ -13729,7 +14160,7 @@
                         <a:buNone/>
                       </a:pPr>
                       <a:r>
-                        <a:rPr lang="es" sz="800">
+                        <a:rPr lang="es" sz="800" dirty="0">
                           <a:latin typeface="Calibri"/>
                           <a:ea typeface="Calibri"/>
                           <a:cs typeface="Calibri"/>
@@ -13737,7 +14168,7 @@
                         </a:rPr>
                         <a:t>serio</a:t>
                       </a:r>
-                      <a:endParaRPr sz="800">
+                      <a:endParaRPr sz="800" dirty="0">
                         <a:latin typeface="Calibri"/>
                         <a:ea typeface="Calibri"/>
                         <a:cs typeface="Calibri"/>
@@ -13802,7 +14233,7 @@
                         <a:buNone/>
                       </a:pPr>
                       <a:r>
-                        <a:rPr lang="es" sz="800">
+                        <a:rPr lang="es" sz="800" dirty="0">
                           <a:latin typeface="Calibri"/>
                           <a:ea typeface="Calibri"/>
                           <a:cs typeface="Calibri"/>
@@ -13810,7 +14241,7 @@
                         </a:rPr>
                         <a:t>contento</a:t>
                       </a:r>
-                      <a:endParaRPr sz="800">
+                      <a:endParaRPr sz="800" dirty="0">
                         <a:latin typeface="Calibri"/>
                         <a:ea typeface="Calibri"/>
                         <a:cs typeface="Calibri"/>
@@ -13875,13 +14306,21 @@
                         <a:buNone/>
                       </a:pPr>
                       <a:r>
-                        <a:rPr lang="es" sz="800">
+                        <a:rPr lang="es" sz="800" dirty="0">
                           <a:latin typeface="Calibri"/>
                           <a:ea typeface="Calibri"/>
                           <a:cs typeface="Calibri"/>
                           <a:sym typeface="Calibri"/>
                         </a:rPr>
-                        <a:t>feliz </a:t>
+                        <a:t>feliz</a:t>
+                      </a:r>
+                      <a:r>
+                        <a:rPr lang="es" sz="800" dirty="0">
+                          <a:latin typeface="Calibri"/>
+                          <a:ea typeface="Calibri"/>
+                          <a:cs typeface="Calibri"/>
+                        </a:rPr>
+                        <a:t> </a:t>
                       </a:r>
                       <a:endParaRPr sz="800">
                         <a:latin typeface="Calibri"/>
@@ -13948,7 +14387,7 @@
                         <a:buNone/>
                       </a:pPr>
                       <a:r>
-                        <a:rPr lang="es" sz="800">
+                        <a:rPr lang="es" sz="800" dirty="0">
                           <a:latin typeface="Calibri"/>
                           <a:ea typeface="Calibri"/>
                           <a:cs typeface="Calibri"/>
@@ -13956,7 +14395,7 @@
                         </a:rPr>
                         <a:t>muy feliz</a:t>
                       </a:r>
-                      <a:endParaRPr sz="800">
+                      <a:endParaRPr sz="800" dirty="0">
                         <a:latin typeface="Calibri"/>
                         <a:ea typeface="Calibri"/>
                         <a:cs typeface="Calibri"/>
@@ -14009,7 +14448,7 @@
                   </a:ext>
                 </a:extLst>
               </a:tr>
-              <a:tr h="1454300">
+              <a:tr h="1430357">
                 <a:tc>
                   <a:txBody>
                     <a:bodyPr/>
@@ -14028,15 +14467,23 @@
                         <a:buNone/>
                       </a:pPr>
                       <a:r>
-                        <a:rPr lang="es" sz="800" b="1">
+                        <a:rPr lang="es" sz="1000" b="1" dirty="0">
                           <a:latin typeface="Calibri"/>
                           <a:ea typeface="Calibri"/>
                           <a:cs typeface="Calibri"/>
                           <a:sym typeface="Calibri"/>
                         </a:rPr>
-                        <a:t>IDEAS Y RECOMENDACIONES</a:t>
+                        <a:t>IDEAS Y </a:t>
                       </a:r>
-                      <a:endParaRPr sz="800" b="1">
+                      <a:r>
+                        <a:rPr lang="es" sz="1000" b="1" dirty="0">
+                          <a:latin typeface="Calibri"/>
+                          <a:ea typeface="Calibri"/>
+                          <a:cs typeface="Calibri"/>
+                        </a:rPr>
+                        <a:t>RECOMENDA-CIONES</a:t>
+                      </a:r>
+                      <a:endParaRPr sz="1000" b="1" dirty="0">
                         <a:latin typeface="Calibri"/>
                         <a:ea typeface="Calibri"/>
                         <a:cs typeface="Calibri"/>
@@ -14157,7 +14604,7 @@
                         <a:buNone/>
                       </a:pPr>
                       <a:r>
-                        <a:rPr lang="es" sz="800">
+                        <a:rPr lang="es" sz="800" dirty="0">
                           <a:latin typeface="Calibri"/>
                           <a:ea typeface="Calibri"/>
                           <a:cs typeface="Calibri"/>
@@ -14165,7 +14612,7 @@
                         </a:rPr>
                         <a:t>Recomendar eventos cercanos a la ubicación de los usuarios, clasificados por tipo de actividad deportiva, etc.</a:t>
                       </a:r>
-                      <a:endParaRPr sz="800">
+                      <a:endParaRPr sz="800" dirty="0">
                         <a:latin typeface="Calibri"/>
                         <a:ea typeface="Calibri"/>
                         <a:cs typeface="Calibri"/>
@@ -14286,7 +14733,7 @@
                         <a:buNone/>
                       </a:pPr>
                       <a:r>
-                        <a:rPr lang="es" sz="800">
+                        <a:rPr lang="es" sz="800" dirty="0">
                           <a:latin typeface="Calibri"/>
                           <a:ea typeface="Calibri"/>
                           <a:cs typeface="Calibri"/>
@@ -14294,7 +14741,7 @@
                         </a:rPr>
                         <a:t>Mostrar las valoraciones que otros usuarios han hecho de los participantes y organizadores, con un sistema sencillo y muy visual, que impida comentarios hirientes, ej.: carita sonriente, normal o triste</a:t>
                       </a:r>
-                      <a:endParaRPr sz="800">
+                      <a:endParaRPr sz="800" dirty="0">
                         <a:latin typeface="Calibri"/>
                         <a:ea typeface="Calibri"/>
                         <a:cs typeface="Calibri"/>
@@ -14359,7 +14806,7 @@
                         <a:buNone/>
                       </a:pPr>
                       <a:r>
-                        <a:rPr lang="es" sz="800">
+                        <a:rPr lang="es" sz="800" dirty="0">
                           <a:latin typeface="Calibri"/>
                           <a:ea typeface="Calibri"/>
                           <a:cs typeface="Calibri"/>
@@ -14367,7 +14814,7 @@
                         </a:rPr>
                         <a:t>Sistema de alertas de los mensajes enviados por otros usuarios</a:t>
                       </a:r>
-                      <a:endParaRPr sz="800">
+                      <a:endParaRPr sz="800" dirty="0">
                         <a:latin typeface="Calibri"/>
                         <a:ea typeface="Calibri"/>
                         <a:cs typeface="Calibri"/>
@@ -14432,7 +14879,7 @@
                         <a:buNone/>
                       </a:pPr>
                       <a:r>
-                        <a:rPr lang="es" sz="800">
+                        <a:rPr lang="es" sz="800" dirty="0">
                           <a:latin typeface="Calibri"/>
                           <a:ea typeface="Calibri"/>
                           <a:cs typeface="Calibri"/>
@@ -14440,7 +14887,7 @@
                         </a:rPr>
                         <a:t>Tener centralizado en una misma pantalla el estado en el que se encuentran las actividades a las que me he inscrito; ejemplos de estado: admitido, en lista de espera, actividad confirmada, cancelada o realizada, etc.</a:t>
                       </a:r>
-                      <a:endParaRPr sz="800">
+                      <a:endParaRPr sz="800" dirty="0">
                         <a:latin typeface="Calibri"/>
                         <a:ea typeface="Calibri"/>
                         <a:cs typeface="Calibri"/>
@@ -14505,7 +14952,7 @@
                         <a:buNone/>
                       </a:pPr>
                       <a:r>
-                        <a:rPr lang="es" sz="800">
+                        <a:rPr lang="es" sz="800" dirty="0">
                           <a:latin typeface="Calibri"/>
                           <a:ea typeface="Calibri"/>
                           <a:cs typeface="Calibri"/>
@@ -14513,7 +14960,7 @@
                         </a:rPr>
                         <a:t>Utilizar un sistema de valoración de los usuarios y organizadores, que sea muy sencillo, visual y que impida comentarios hirientes. ej.: carita sonriente, normal o triste</a:t>
                       </a:r>
-                      <a:endParaRPr sz="800">
+                      <a:endParaRPr sz="800" dirty="0">
                         <a:latin typeface="Calibri"/>
                         <a:ea typeface="Calibri"/>
                         <a:cs typeface="Calibri"/>
@@ -14608,33 +15055,58 @@
         <p:spPr>
           <a:xfrm>
             <a:off x="203100" y="232800"/>
-            <a:ext cx="8737800" cy="621000"/>
+            <a:ext cx="8737800" cy="644486"/>
           </a:xfrm>
           <a:prstGeom prst="rect">
             <a:avLst/>
           </a:prstGeom>
         </p:spPr>
         <p:txBody>
-          <a:bodyPr spcFirstLastPara="1" wrap="square" lIns="91425" tIns="91425" rIns="91425" bIns="91425" anchor="t" anchorCtr="0">
+          <a:bodyPr spcFirstLastPara="1" wrap="square" lIns="91425" tIns="91425" rIns="91425" bIns="0" anchor="t" anchorCtr="0">
             <a:normAutofit/>
           </a:bodyPr>
           <a:lstStyle/>
           <a:p>
-            <a:pPr marL="0" lvl="0" indent="0" algn="ctr" rtl="0">
-              <a:spcBef>
-                <a:spcPts val="0"/>
-              </a:spcBef>
-              <a:spcAft>
-                <a:spcPts val="0"/>
-              </a:spcAft>
+            <a:pPr algn="ctr">
               <a:buSzPts val="990"/>
-              <a:buNone/>
             </a:pPr>
             <a:r>
-              <a:rPr lang="es" sz="2300"/>
-              <a:t>Journey Map: Búsqueda de personas con quien practicar deporte</a:t>
+              <a:rPr lang="es" sz="2300" dirty="0" err="1">
+                <a:solidFill>
+                  <a:srgbClr val="000000"/>
+                </a:solidFill>
+              </a:rPr>
+              <a:t>Journey</a:t>
             </a:r>
-            <a:endParaRPr sz="2300"/>
+            <a:r>
+              <a:rPr lang="es" sz="2300" dirty="0">
+                <a:solidFill>
+                  <a:srgbClr val="000000"/>
+                </a:solidFill>
+              </a:rPr>
+              <a:t> </a:t>
+            </a:r>
+            <a:r>
+              <a:rPr lang="es" sz="2300" dirty="0" err="1">
+                <a:solidFill>
+                  <a:srgbClr val="000000"/>
+                </a:solidFill>
+              </a:rPr>
+              <a:t>Map</a:t>
+            </a:r>
+            <a:r>
+              <a:rPr lang="es" sz="2300" dirty="0">
+                <a:solidFill>
+                  <a:srgbClr val="000000"/>
+                </a:solidFill>
+              </a:rPr>
+              <a:t>: Organizar Actividad Deportiva</a:t>
+            </a:r>
+            <a:endParaRPr lang="es-ES" sz="2300">
+              <a:solidFill>
+                <a:srgbClr val="000000"/>
+              </a:solidFill>
+            </a:endParaRPr>
           </a:p>
         </p:txBody>
       </p:sp>
@@ -14642,11 +15114,17 @@
         <p:nvGraphicFramePr>
           <p:cNvPr id="171" name="Google Shape;171;p20"/>
           <p:cNvGraphicFramePr/>
-          <p:nvPr/>
+          <p:nvPr>
+            <p:extLst>
+              <p:ext uri="{D42A27DB-BD31-4B8C-83A1-F6EECF244321}">
+                <p14:modId xmlns:p14="http://schemas.microsoft.com/office/powerpoint/2010/main" val="2010408635"/>
+              </p:ext>
+            </p:extLst>
+          </p:nvPr>
         </p:nvGraphicFramePr>
         <p:xfrm>
-          <a:off x="203175" y="853800"/>
-          <a:ext cx="8737825" cy="4061754"/>
+          <a:off x="167456" y="860944"/>
+          <a:ext cx="8825869" cy="4038576"/>
         </p:xfrm>
         <a:graphic>
           <a:graphicData uri="http://schemas.openxmlformats.org/drawingml/2006/table">
@@ -14656,56 +15134,56 @@
                 <a:tableStyleId>{7D1EFDEC-BACA-459D-A49C-83122E7706D0}</a:tableStyleId>
               </a:tblPr>
               <a:tblGrid>
-                <a:gridCol w="1038700">
+                <a:gridCol w="1028160">
                   <a:extLst>
                     <a:ext uri="{9D8B030D-6E8A-4147-A177-3AD203B41FA5}">
                       <a16:colId xmlns:a16="http://schemas.microsoft.com/office/drawing/2014/main" val="20000"/>
                     </a:ext>
                   </a:extLst>
                 </a:gridCol>
-                <a:gridCol w="1102475">
+                <a:gridCol w="963456">
                   <a:extLst>
                     <a:ext uri="{9D8B030D-6E8A-4147-A177-3AD203B41FA5}">
                       <a16:colId xmlns:a16="http://schemas.microsoft.com/office/drawing/2014/main" val="20001"/>
                     </a:ext>
                   </a:extLst>
                 </a:gridCol>
-                <a:gridCol w="972825">
+                <a:gridCol w="928101">
                   <a:extLst>
                     <a:ext uri="{9D8B030D-6E8A-4147-A177-3AD203B41FA5}">
                       <a16:colId xmlns:a16="http://schemas.microsoft.com/office/drawing/2014/main" val="20002"/>
                     </a:ext>
                   </a:extLst>
                 </a:gridCol>
-                <a:gridCol w="992900">
+                <a:gridCol w="901585">
                   <a:extLst>
                     <a:ext uri="{9D8B030D-6E8A-4147-A177-3AD203B41FA5}">
                       <a16:colId xmlns:a16="http://schemas.microsoft.com/office/drawing/2014/main" val="20003"/>
                     </a:ext>
                   </a:extLst>
                 </a:gridCol>
-                <a:gridCol w="1223050">
+                <a:gridCol w="1290505">
                   <a:extLst>
                     <a:ext uri="{9D8B030D-6E8A-4147-A177-3AD203B41FA5}">
                       <a16:colId xmlns:a16="http://schemas.microsoft.com/office/drawing/2014/main" val="20004"/>
                     </a:ext>
                   </a:extLst>
                 </a:gridCol>
-                <a:gridCol w="1002000">
+                <a:gridCol w="1025331">
                   <a:extLst>
                     <a:ext uri="{9D8B030D-6E8A-4147-A177-3AD203B41FA5}">
                       <a16:colId xmlns:a16="http://schemas.microsoft.com/office/drawing/2014/main" val="20005"/>
                     </a:ext>
                   </a:extLst>
                 </a:gridCol>
-                <a:gridCol w="1303400">
+                <a:gridCol w="1420716">
                   <a:extLst>
                     <a:ext uri="{9D8B030D-6E8A-4147-A177-3AD203B41FA5}">
                       <a16:colId xmlns:a16="http://schemas.microsoft.com/office/drawing/2014/main" val="20006"/>
                     </a:ext>
                   </a:extLst>
                 </a:gridCol>
-                <a:gridCol w="1102475">
+                <a:gridCol w="1268015">
                   <a:extLst>
                     <a:ext uri="{9D8B030D-6E8A-4147-A177-3AD203B41FA5}">
                       <a16:colId xmlns:a16="http://schemas.microsoft.com/office/drawing/2014/main" val="20007"/>
@@ -14713,7 +15191,7 @@
                   </a:extLst>
                 </a:gridCol>
               </a:tblGrid>
-              <a:tr h="226525">
+              <a:tr h="269673">
                 <a:tc>
                   <a:txBody>
                     <a:bodyPr/>
@@ -14732,7 +15210,7 @@
                         <a:buNone/>
                       </a:pPr>
                       <a:r>
-                        <a:rPr lang="es" sz="800" b="1">
+                        <a:rPr lang="es" sz="1000" b="1" dirty="0">
                           <a:latin typeface="Calibri"/>
                           <a:ea typeface="Calibri"/>
                           <a:cs typeface="Calibri"/>
@@ -14740,7 +15218,7 @@
                         </a:rPr>
                         <a:t>ETAPAS</a:t>
                       </a:r>
-                      <a:endParaRPr sz="800" b="1">
+                      <a:endParaRPr sz="1000" b="1" dirty="0">
                         <a:latin typeface="Calibri"/>
                         <a:ea typeface="Calibri"/>
                         <a:cs typeface="Calibri"/>
@@ -14805,7 +15283,7 @@
                         <a:buNone/>
                       </a:pPr>
                       <a:r>
-                        <a:rPr lang="es" sz="800" b="1">
+                        <a:rPr lang="es" sz="1000" b="1" dirty="0">
                           <a:latin typeface="Calibri"/>
                           <a:ea typeface="Calibri"/>
                           <a:cs typeface="Calibri"/>
@@ -14813,7 +15291,7 @@
                         </a:rPr>
                         <a:t>ETAPA 1</a:t>
                       </a:r>
-                      <a:endParaRPr sz="800" b="1">
+                      <a:endParaRPr sz="1000" b="1" dirty="0">
                         <a:latin typeface="Calibri"/>
                         <a:ea typeface="Calibri"/>
                         <a:cs typeface="Calibri"/>
@@ -14878,7 +15356,7 @@
                         <a:buNone/>
                       </a:pPr>
                       <a:r>
-                        <a:rPr lang="es" sz="800" b="1">
+                        <a:rPr lang="es" sz="1000" b="1" dirty="0">
                           <a:latin typeface="Calibri"/>
                           <a:ea typeface="Calibri"/>
                           <a:cs typeface="Calibri"/>
@@ -14886,7 +15364,7 @@
                         </a:rPr>
                         <a:t>ETAPA 2</a:t>
                       </a:r>
-                      <a:endParaRPr sz="800" b="1">
+                      <a:endParaRPr sz="1000" b="1" dirty="0">
                         <a:latin typeface="Calibri"/>
                         <a:ea typeface="Calibri"/>
                         <a:cs typeface="Calibri"/>
@@ -14951,7 +15429,7 @@
                         <a:buNone/>
                       </a:pPr>
                       <a:r>
-                        <a:rPr lang="es" sz="800" b="1">
+                        <a:rPr lang="es" sz="1000" b="1" dirty="0">
                           <a:latin typeface="Calibri"/>
                           <a:ea typeface="Calibri"/>
                           <a:cs typeface="Calibri"/>
@@ -14959,7 +15437,7 @@
                         </a:rPr>
                         <a:t>ETAPA 3</a:t>
                       </a:r>
-                      <a:endParaRPr sz="800" b="1">
+                      <a:endParaRPr sz="1000" b="1" dirty="0">
                         <a:latin typeface="Calibri"/>
                         <a:ea typeface="Calibri"/>
                         <a:cs typeface="Calibri"/>
@@ -15024,7 +15502,7 @@
                         <a:buNone/>
                       </a:pPr>
                       <a:r>
-                        <a:rPr lang="es" sz="800" b="1">
+                        <a:rPr lang="es" sz="1000" b="1" dirty="0">
                           <a:latin typeface="Calibri"/>
                           <a:ea typeface="Calibri"/>
                           <a:cs typeface="Calibri"/>
@@ -15032,7 +15510,7 @@
                         </a:rPr>
                         <a:t>ETAPA 4</a:t>
                       </a:r>
-                      <a:endParaRPr sz="800" b="1">
+                      <a:endParaRPr sz="1000" b="1" dirty="0">
                         <a:latin typeface="Calibri"/>
                         <a:ea typeface="Calibri"/>
                         <a:cs typeface="Calibri"/>
@@ -15097,7 +15575,7 @@
                         <a:buNone/>
                       </a:pPr>
                       <a:r>
-                        <a:rPr lang="es" sz="800" b="1">
+                        <a:rPr lang="es" sz="1000" b="1" dirty="0">
                           <a:latin typeface="Calibri"/>
                           <a:ea typeface="Calibri"/>
                           <a:cs typeface="Calibri"/>
@@ -15105,7 +15583,7 @@
                         </a:rPr>
                         <a:t>ETAPA 5</a:t>
                       </a:r>
-                      <a:endParaRPr sz="800" b="1">
+                      <a:endParaRPr sz="1000" b="1" dirty="0">
                         <a:latin typeface="Calibri"/>
                         <a:ea typeface="Calibri"/>
                         <a:cs typeface="Calibri"/>
@@ -15170,7 +15648,7 @@
                         <a:buNone/>
                       </a:pPr>
                       <a:r>
-                        <a:rPr lang="es" sz="800" b="1">
+                        <a:rPr lang="es" sz="1000" b="1" dirty="0">
                           <a:latin typeface="Calibri"/>
                           <a:ea typeface="Calibri"/>
                           <a:cs typeface="Calibri"/>
@@ -15178,7 +15656,7 @@
                         </a:rPr>
                         <a:t>ETAPA 6</a:t>
                       </a:r>
-                      <a:endParaRPr sz="800" b="1">
+                      <a:endParaRPr sz="1000" b="1" dirty="0">
                         <a:latin typeface="Calibri"/>
                         <a:ea typeface="Calibri"/>
                         <a:cs typeface="Calibri"/>
@@ -15243,7 +15721,7 @@
                         <a:buNone/>
                       </a:pPr>
                       <a:r>
-                        <a:rPr lang="es" sz="800" b="1">
+                        <a:rPr lang="es" sz="1000" b="1" dirty="0">
                           <a:latin typeface="Calibri"/>
                           <a:ea typeface="Calibri"/>
                           <a:cs typeface="Calibri"/>
@@ -15251,7 +15729,7 @@
                         </a:rPr>
                         <a:t>ETAPA 7</a:t>
                       </a:r>
-                      <a:endParaRPr sz="800" b="1">
+                      <a:endParaRPr sz="1000" b="1" dirty="0">
                         <a:latin typeface="Calibri"/>
                         <a:ea typeface="Calibri"/>
                         <a:cs typeface="Calibri"/>
@@ -15304,7 +15782,7 @@
                   </a:ext>
                 </a:extLst>
               </a:tr>
-              <a:tr h="1153525">
+              <a:tr h="1209177">
                 <a:tc>
                   <a:txBody>
                     <a:bodyPr/>
@@ -15323,7 +15801,7 @@
                         <a:buNone/>
                       </a:pPr>
                       <a:r>
-                        <a:rPr lang="es" sz="800" b="1">
+                        <a:rPr lang="es" sz="1000" b="1" dirty="0">
                           <a:latin typeface="Calibri"/>
                           <a:ea typeface="Calibri"/>
                           <a:cs typeface="Calibri"/>
@@ -15331,7 +15809,7 @@
                         </a:rPr>
                         <a:t>OBJETIVOS DEL USUARIO</a:t>
                       </a:r>
-                      <a:endParaRPr sz="800" b="1">
+                      <a:endParaRPr sz="1000" b="1" dirty="0">
                         <a:latin typeface="Calibri"/>
                         <a:ea typeface="Calibri"/>
                         <a:cs typeface="Calibri"/>
@@ -15396,15 +15874,23 @@
                         <a:buNone/>
                       </a:pPr>
                       <a:r>
-                        <a:rPr lang="es" sz="800">
+                        <a:rPr lang="es" sz="800" dirty="0">
                           <a:latin typeface="Calibri"/>
                           <a:ea typeface="Calibri"/>
                           <a:cs typeface="Calibri"/>
                           <a:sym typeface="Calibri"/>
                         </a:rPr>
-                        <a:t>Practicar deporte en compañía</a:t>
+                        <a:t>Practicar deporte en </a:t>
                       </a:r>
-                      <a:endParaRPr sz="800">
+                      <a:r>
+                        <a:rPr lang="es" sz="800" dirty="0">
+                          <a:latin typeface="Calibri"/>
+                          <a:ea typeface="Calibri"/>
+                          <a:cs typeface="Calibri"/>
+                        </a:rPr>
+                        <a:t>grupo</a:t>
+                      </a:r>
+                      <a:endParaRPr sz="800" dirty="0">
                         <a:latin typeface="Calibri"/>
                         <a:ea typeface="Calibri"/>
                         <a:cs typeface="Calibri"/>
@@ -15469,7 +15955,7 @@
                         <a:buNone/>
                       </a:pPr>
                       <a:r>
-                        <a:rPr lang="es" sz="800">
+                        <a:rPr lang="es" sz="800" dirty="0">
                           <a:latin typeface="Calibri"/>
                           <a:ea typeface="Calibri"/>
                           <a:cs typeface="Calibri"/>
@@ -15477,7 +15963,7 @@
                         </a:rPr>
                         <a:t>Organizar la actividad deportiva que quiere practicar con otros deportistas.</a:t>
                       </a:r>
-                      <a:endParaRPr sz="800">
+                      <a:endParaRPr sz="800" dirty="0">
                         <a:latin typeface="Calibri"/>
                         <a:ea typeface="Calibri"/>
                         <a:cs typeface="Calibri"/>
@@ -15542,7 +16028,7 @@
                         <a:buNone/>
                       </a:pPr>
                       <a:r>
-                        <a:rPr lang="es" sz="800">
+                        <a:rPr lang="es" sz="800" dirty="0">
                           <a:latin typeface="Calibri"/>
                           <a:ea typeface="Calibri"/>
                           <a:cs typeface="Calibri"/>
@@ -15550,7 +16036,7 @@
                         </a:rPr>
                         <a:t>Establecer los requisitos exigidos para participar en la actividad deportiva.</a:t>
                       </a:r>
-                      <a:endParaRPr sz="800">
+                      <a:endParaRPr sz="800" dirty="0">
                         <a:latin typeface="Calibri"/>
                         <a:ea typeface="Calibri"/>
                         <a:cs typeface="Calibri"/>
@@ -15615,7 +16101,7 @@
                         <a:buNone/>
                       </a:pPr>
                       <a:r>
-                        <a:rPr lang="es" sz="800">
+                        <a:rPr lang="es" sz="800" dirty="0">
                           <a:latin typeface="Calibri"/>
                           <a:ea typeface="Calibri"/>
                           <a:cs typeface="Calibri"/>
@@ -15623,7 +16109,7 @@
                         </a:rPr>
                         <a:t>Antes de quedar con desconocidos para hacer deporte, le gustaría tener referencias de esas personas.</a:t>
                       </a:r>
-                      <a:endParaRPr sz="800">
+                      <a:endParaRPr sz="800" dirty="0">
                         <a:latin typeface="Calibri"/>
                         <a:ea typeface="Calibri"/>
                         <a:cs typeface="Calibri"/>
@@ -15688,7 +16174,7 @@
                         <a:buNone/>
                       </a:pPr>
                       <a:r>
-                        <a:rPr lang="es" sz="800">
+                        <a:rPr lang="es" sz="800" dirty="0">
                           <a:latin typeface="Calibri"/>
                           <a:ea typeface="Calibri"/>
                           <a:cs typeface="Calibri"/>
@@ -15696,7 +16182,7 @@
                         </a:rPr>
                         <a:t>Contactar con las personas interesadas en compartir la práctica deportiva, sin facilitar información personal (teléfono, etc.).</a:t>
                       </a:r>
-                      <a:endParaRPr sz="800">
+                      <a:endParaRPr sz="800" dirty="0">
                         <a:latin typeface="Calibri"/>
                         <a:ea typeface="Calibri"/>
                         <a:cs typeface="Calibri"/>
@@ -15761,7 +16247,7 @@
                         <a:buNone/>
                       </a:pPr>
                       <a:r>
-                        <a:rPr lang="es" sz="800">
+                        <a:rPr lang="es" sz="800" dirty="0">
                           <a:latin typeface="Calibri"/>
                           <a:ea typeface="Calibri"/>
                           <a:cs typeface="Calibri"/>
@@ -15769,7 +16255,7 @@
                         </a:rPr>
                         <a:t>Gestionar y comunicar el estado de la actividad (confirmada, cancelada, etc.), y el estado de las inscripciones a la actividad (admitido, en lista de espera, cancelada, etc.)</a:t>
                       </a:r>
-                      <a:endParaRPr sz="800">
+                      <a:endParaRPr sz="800" dirty="0">
                         <a:latin typeface="Calibri"/>
                         <a:ea typeface="Calibri"/>
                         <a:cs typeface="Calibri"/>
@@ -15834,7 +16320,7 @@
                         <a:buNone/>
                       </a:pPr>
                       <a:r>
-                        <a:rPr lang="es" sz="800">
+                        <a:rPr lang="es" sz="800" dirty="0">
                           <a:latin typeface="Calibri"/>
                           <a:ea typeface="Calibri"/>
                           <a:cs typeface="Calibri"/>
@@ -15842,7 +16328,7 @@
                         </a:rPr>
                         <a:t>Tras la participación en una actividad deportiva, le gustaría poder dar su opinión sobre los participantes, y poder ocultar las siguientes actividades a usuarios concretos.</a:t>
                       </a:r>
-                      <a:endParaRPr sz="800">
+                      <a:endParaRPr sz="800" dirty="0">
                         <a:latin typeface="Calibri"/>
                         <a:ea typeface="Calibri"/>
                         <a:cs typeface="Calibri"/>
@@ -15895,7 +16381,7 @@
                   </a:ext>
                 </a:extLst>
               </a:tr>
-              <a:tr h="0">
+              <a:tr h="269673">
                 <a:tc>
                   <a:txBody>
                     <a:bodyPr/>
@@ -15914,15 +16400,23 @@
                         <a:buNone/>
                       </a:pPr>
                       <a:r>
-                        <a:rPr lang="es" sz="800" b="1">
+                        <a:rPr lang="es" sz="1000" b="1" dirty="0">
+                          <a:latin typeface="Calibri"/>
+                          <a:ea typeface="Calibri"/>
+                          <a:cs typeface="Calibri"/>
+                        </a:rPr>
+                        <a:t>DETA.</a:t>
+                      </a:r>
+                      <a:r>
+                        <a:rPr lang="es" sz="1000" b="1" dirty="0">
                           <a:latin typeface="Calibri"/>
                           <a:ea typeface="Calibri"/>
                           <a:cs typeface="Calibri"/>
                           <a:sym typeface="Calibri"/>
                         </a:rPr>
-                        <a:t>DETALLES / ENTORNO</a:t>
+                        <a:t> / ENTORNO</a:t>
                       </a:r>
-                      <a:endParaRPr sz="800" b="1">
+                      <a:endParaRPr sz="1000" b="1" dirty="0">
                         <a:latin typeface="Calibri"/>
                         <a:ea typeface="Calibri"/>
                         <a:cs typeface="Calibri"/>
@@ -16367,7 +16861,7 @@
                   </a:ext>
                 </a:extLst>
               </a:tr>
-              <a:tr h="757450">
+              <a:tr h="791622">
                 <a:tc>
                   <a:txBody>
                     <a:bodyPr/>
@@ -16386,15 +16880,51 @@
                         <a:buNone/>
                       </a:pPr>
                       <a:r>
-                        <a:rPr lang="es" sz="800" b="1">
+                        <a:rPr lang="es" sz="1000" b="1" dirty="0">
                           <a:latin typeface="Calibri"/>
                           <a:ea typeface="Calibri"/>
                           <a:cs typeface="Calibri"/>
                           <a:sym typeface="Calibri"/>
                         </a:rPr>
-                        <a:t>PENSAMIENTOS DE USUARIO</a:t>
+                        <a:t>PENSAMIENTOS</a:t>
                       </a:r>
-                      <a:endParaRPr sz="800" b="1">
+                      <a:endParaRPr lang="es-ES" sz="1000" b="1" dirty="0">
+                        <a:latin typeface="Calibri"/>
+                        <a:ea typeface="Calibri"/>
+                        <a:cs typeface="Calibri"/>
+                      </a:endParaRPr>
+                    </a:p>
+                    <a:p>
+                      <a:pPr marL="0" lvl="0" indent="0" algn="ctr">
+                        <a:lnSpc>
+                          <a:spcPct val="114999"/>
+                        </a:lnSpc>
+                        <a:spcBef>
+                          <a:spcPts val="0"/>
+                        </a:spcBef>
+                        <a:spcAft>
+                          <a:spcPts val="0"/>
+                        </a:spcAft>
+                        <a:buNone/>
+                      </a:pPr>
+                      <a:r>
+                        <a:rPr lang="es" sz="1000" b="1" dirty="0">
+                          <a:latin typeface="Calibri"/>
+                          <a:ea typeface="Calibri"/>
+                          <a:cs typeface="Calibri"/>
+                        </a:rPr>
+                        <a:t>DEL</a:t>
+                      </a:r>
+                      <a:r>
+                        <a:rPr lang="es" sz="1000" b="1" dirty="0">
+                          <a:latin typeface="Calibri"/>
+                          <a:ea typeface="Calibri"/>
+                          <a:cs typeface="Calibri"/>
+                          <a:sym typeface="Calibri"/>
+                        </a:rPr>
+                        <a:t> USUARIO</a:t>
+                      </a:r>
+                      <a:endParaRPr sz="1000" b="1" dirty="0">
                         <a:latin typeface="Calibri"/>
                         <a:ea typeface="Calibri"/>
                         <a:cs typeface="Calibri"/>
@@ -16459,7 +16989,7 @@
                         <a:buNone/>
                       </a:pPr>
                       <a:r>
-                        <a:rPr lang="es" sz="800">
+                        <a:rPr lang="es" sz="800" dirty="0">
                           <a:latin typeface="Calibri"/>
                           <a:ea typeface="Calibri"/>
                           <a:cs typeface="Calibri"/>
@@ -16467,7 +16997,7 @@
                         </a:rPr>
                         <a:t>No conozco a nadie con quien practicar deporte. O necesito a más gente para jugar a un deporte de equipo</a:t>
                       </a:r>
-                      <a:endParaRPr sz="800">
+                      <a:endParaRPr sz="800" dirty="0">
                         <a:latin typeface="Calibri"/>
                         <a:ea typeface="Calibri"/>
                         <a:cs typeface="Calibri"/>
@@ -16532,15 +17062,23 @@
                         <a:buNone/>
                       </a:pPr>
                       <a:r>
-                        <a:rPr lang="es" sz="800">
+                        <a:rPr lang="es" sz="800" dirty="0">
+                          <a:latin typeface="Calibri"/>
+                          <a:ea typeface="Calibri"/>
+                          <a:cs typeface="Calibri"/>
+                        </a:rPr>
+                        <a:t> </a:t>
+                      </a:r>
+                      <a:r>
+                        <a:rPr lang="es" sz="800" dirty="0">
                           <a:latin typeface="Calibri"/>
                           <a:ea typeface="Calibri"/>
                           <a:cs typeface="Calibri"/>
                           <a:sym typeface="Calibri"/>
                         </a:rPr>
-                        <a:t> ¿Como comunico a otras personas la actividad deportiva que he organizado?</a:t>
+                        <a:t>¿Como comunico a otras personas la actividad deportiva que he organizado?</a:t>
                       </a:r>
-                      <a:endParaRPr sz="800">
+                      <a:endParaRPr sz="800" dirty="0">
                         <a:latin typeface="Calibri"/>
                         <a:ea typeface="Calibri"/>
                         <a:cs typeface="Calibri"/>
@@ -16605,7 +17143,7 @@
                         <a:buNone/>
                       </a:pPr>
                       <a:r>
-                        <a:rPr lang="es" sz="800">
+                        <a:rPr lang="es" sz="800" dirty="0">
                           <a:latin typeface="Calibri"/>
                           <a:ea typeface="Calibri"/>
                           <a:cs typeface="Calibri"/>
@@ -16613,7 +17151,7 @@
                         </a:rPr>
                         <a:t>¿Como comunico a los interesados los requisitos que deben cumplir?</a:t>
                       </a:r>
-                      <a:endParaRPr sz="800">
+                      <a:endParaRPr sz="800" dirty="0">
                         <a:latin typeface="Calibri"/>
                         <a:ea typeface="Calibri"/>
                         <a:cs typeface="Calibri"/>
@@ -16678,7 +17216,7 @@
                         <a:buNone/>
                       </a:pPr>
                       <a:r>
-                        <a:rPr lang="es" sz="800">
+                        <a:rPr lang="es" sz="800" dirty="0">
                           <a:latin typeface="Calibri"/>
                           <a:ea typeface="Calibri"/>
                           <a:cs typeface="Calibri"/>
@@ -16686,7 +17224,7 @@
                         </a:rPr>
                         <a:t>La mayoría de esas personas son desconocidas ¿Es gente maja?</a:t>
                       </a:r>
-                      <a:endParaRPr sz="800">
+                      <a:endParaRPr sz="800" dirty="0">
                         <a:latin typeface="Calibri"/>
                         <a:ea typeface="Calibri"/>
                         <a:cs typeface="Calibri"/>
@@ -16751,7 +17289,7 @@
                         <a:buNone/>
                       </a:pPr>
                       <a:r>
-                        <a:rPr lang="es" sz="800">
+                        <a:rPr lang="es" sz="800" dirty="0">
                           <a:latin typeface="Calibri"/>
                           <a:ea typeface="Calibri"/>
                           <a:cs typeface="Calibri"/>
@@ -16759,7 +17297,7 @@
                         </a:rPr>
                         <a:t>¿Cómo contacto con esas personas sin facilitarles mis datos personales de contacto?</a:t>
                       </a:r>
-                      <a:endParaRPr sz="800">
+                      <a:endParaRPr sz="800" dirty="0">
                         <a:latin typeface="Calibri"/>
                         <a:ea typeface="Calibri"/>
                         <a:cs typeface="Calibri"/>
@@ -16824,7 +17362,7 @@
                         <a:buNone/>
                       </a:pPr>
                       <a:r>
-                        <a:rPr lang="es" sz="800">
+                        <a:rPr lang="es" sz="800" dirty="0">
                           <a:latin typeface="Calibri"/>
                           <a:ea typeface="Calibri"/>
                           <a:cs typeface="Calibri"/>
@@ -16832,7 +17370,7 @@
                         </a:rPr>
                         <a:t>¿Cómo gestiono y comunico el estado de la actividad y las inscripciones?</a:t>
                       </a:r>
-                      <a:endParaRPr sz="800">
+                      <a:endParaRPr sz="800" dirty="0">
                         <a:latin typeface="Calibri"/>
                         <a:ea typeface="Calibri"/>
                         <a:cs typeface="Calibri"/>
@@ -16897,7 +17435,7 @@
                         <a:buNone/>
                       </a:pPr>
                       <a:r>
-                        <a:rPr lang="es" sz="800">
+                        <a:rPr lang="es" sz="800" dirty="0">
                           <a:latin typeface="Calibri"/>
                           <a:ea typeface="Calibri"/>
                           <a:cs typeface="Calibri"/>
@@ -16905,7 +17443,7 @@
                         </a:rPr>
                         <a:t>¡¡Esta app es fantástica!!</a:t>
                       </a:r>
-                      <a:endParaRPr sz="800">
+                      <a:endParaRPr sz="800" dirty="0">
                         <a:latin typeface="Calibri"/>
                         <a:ea typeface="Calibri"/>
                         <a:cs typeface="Calibri"/>
@@ -16958,7 +17496,7 @@
                   </a:ext>
                 </a:extLst>
               </a:tr>
-              <a:tr h="153400">
+              <a:tr h="269673">
                 <a:tc>
                   <a:txBody>
                     <a:bodyPr/>
@@ -16977,7 +17515,7 @@
                         <a:buNone/>
                       </a:pPr>
                       <a:r>
-                        <a:rPr lang="es" sz="800" b="1">
+                        <a:rPr lang="es" sz="1000" b="1" dirty="0">
                           <a:latin typeface="Calibri"/>
                           <a:ea typeface="Calibri"/>
                           <a:cs typeface="Calibri"/>
@@ -16985,7 +17523,7 @@
                         </a:rPr>
                         <a:t>EMOCIONES</a:t>
                       </a:r>
-                      <a:endParaRPr sz="800" b="1">
+                      <a:endParaRPr sz="1000" b="1" dirty="0">
                         <a:latin typeface="Calibri"/>
                         <a:ea typeface="Calibri"/>
                         <a:cs typeface="Calibri"/>
@@ -17050,7 +17588,7 @@
                         <a:buNone/>
                       </a:pPr>
                       <a:r>
-                        <a:rPr lang="es" sz="800">
+                        <a:rPr lang="es" sz="800" dirty="0">
                           <a:latin typeface="Calibri"/>
                           <a:ea typeface="Calibri"/>
                           <a:cs typeface="Calibri"/>
@@ -17058,7 +17596,7 @@
                         </a:rPr>
                         <a:t>muy triste</a:t>
                       </a:r>
-                      <a:endParaRPr sz="800">
+                      <a:endParaRPr sz="800" dirty="0">
                         <a:latin typeface="Calibri"/>
                         <a:ea typeface="Calibri"/>
                         <a:cs typeface="Calibri"/>
@@ -17123,7 +17661,7 @@
                         <a:buNone/>
                       </a:pPr>
                       <a:r>
-                        <a:rPr lang="es" sz="800">
+                        <a:rPr lang="es" sz="800" dirty="0">
                           <a:latin typeface="Calibri"/>
                           <a:ea typeface="Calibri"/>
                           <a:cs typeface="Calibri"/>
@@ -17131,7 +17669,7 @@
                         </a:rPr>
                         <a:t>triste</a:t>
                       </a:r>
-                      <a:endParaRPr sz="800">
+                      <a:endParaRPr sz="800" dirty="0">
                         <a:latin typeface="Calibri"/>
                         <a:ea typeface="Calibri"/>
                         <a:cs typeface="Calibri"/>
@@ -17196,7 +17734,7 @@
                         <a:buNone/>
                       </a:pPr>
                       <a:r>
-                        <a:rPr lang="es" sz="800">
+                        <a:rPr lang="es" sz="800" dirty="0">
                           <a:latin typeface="Calibri"/>
                           <a:ea typeface="Calibri"/>
                           <a:cs typeface="Calibri"/>
@@ -17204,7 +17742,7 @@
                         </a:rPr>
                         <a:t>muy serio</a:t>
                       </a:r>
-                      <a:endParaRPr sz="800">
+                      <a:endParaRPr sz="800" dirty="0">
                         <a:latin typeface="Calibri"/>
                         <a:ea typeface="Calibri"/>
                         <a:cs typeface="Calibri"/>
@@ -17269,7 +17807,7 @@
                         <a:buNone/>
                       </a:pPr>
                       <a:r>
-                        <a:rPr lang="es" sz="800">
+                        <a:rPr lang="es" sz="800" dirty="0">
                           <a:latin typeface="Calibri"/>
                           <a:ea typeface="Calibri"/>
                           <a:cs typeface="Calibri"/>
@@ -17277,7 +17815,7 @@
                         </a:rPr>
                         <a:t>serio</a:t>
                       </a:r>
-                      <a:endParaRPr sz="800">
+                      <a:endParaRPr sz="800" dirty="0">
                         <a:latin typeface="Calibri"/>
                         <a:ea typeface="Calibri"/>
                         <a:cs typeface="Calibri"/>
@@ -17342,7 +17880,7 @@
                         <a:buNone/>
                       </a:pPr>
                       <a:r>
-                        <a:rPr lang="es" sz="800">
+                        <a:rPr lang="es" sz="800" dirty="0">
                           <a:latin typeface="Calibri"/>
                           <a:ea typeface="Calibri"/>
                           <a:cs typeface="Calibri"/>
@@ -17350,7 +17888,7 @@
                         </a:rPr>
                         <a:t>contento</a:t>
                       </a:r>
-                      <a:endParaRPr sz="800">
+                      <a:endParaRPr sz="800" dirty="0">
                         <a:latin typeface="Calibri"/>
                         <a:ea typeface="Calibri"/>
                         <a:cs typeface="Calibri"/>
@@ -17415,13 +17953,21 @@
                         <a:buNone/>
                       </a:pPr>
                       <a:r>
-                        <a:rPr lang="es" sz="800">
+                        <a:rPr lang="es" sz="800" dirty="0">
                           <a:latin typeface="Calibri"/>
                           <a:ea typeface="Calibri"/>
                           <a:cs typeface="Calibri"/>
                           <a:sym typeface="Calibri"/>
                         </a:rPr>
-                        <a:t>feliz </a:t>
+                        <a:t>feliz</a:t>
+                      </a:r>
+                      <a:r>
+                        <a:rPr lang="es" sz="800" dirty="0">
+                          <a:latin typeface="Calibri"/>
+                          <a:ea typeface="Calibri"/>
+                          <a:cs typeface="Calibri"/>
+                        </a:rPr>
+                        <a:t> </a:t>
                       </a:r>
                       <a:endParaRPr sz="800">
                         <a:latin typeface="Calibri"/>
@@ -17488,7 +18034,7 @@
                         <a:buNone/>
                       </a:pPr>
                       <a:r>
-                        <a:rPr lang="es" sz="800">
+                        <a:rPr lang="es" sz="800" dirty="0">
                           <a:latin typeface="Calibri"/>
                           <a:ea typeface="Calibri"/>
                           <a:cs typeface="Calibri"/>
@@ -17496,7 +18042,7 @@
                         </a:rPr>
                         <a:t>muy feliz</a:t>
                       </a:r>
-                      <a:endParaRPr sz="800">
+                      <a:endParaRPr sz="800" dirty="0">
                         <a:latin typeface="Calibri"/>
                         <a:ea typeface="Calibri"/>
                         <a:cs typeface="Calibri"/>
@@ -17549,7 +18095,7 @@
                   </a:ext>
                 </a:extLst>
               </a:tr>
-              <a:tr h="1316500">
+              <a:tr h="1226581">
                 <a:tc>
                   <a:txBody>
                     <a:bodyPr/>
@@ -17568,15 +18114,23 @@
                         <a:buNone/>
                       </a:pPr>
                       <a:r>
-                        <a:rPr lang="es" sz="800" b="1">
+                        <a:rPr lang="es" sz="1000" b="1" dirty="0">
                           <a:latin typeface="Calibri"/>
                           <a:ea typeface="Calibri"/>
                           <a:cs typeface="Calibri"/>
                           <a:sym typeface="Calibri"/>
                         </a:rPr>
-                        <a:t>IDEAS Y RECOMENDACIONES</a:t>
+                        <a:t>IDEAS Y </a:t>
                       </a:r>
-                      <a:endParaRPr sz="800" b="1">
+                      <a:r>
+                        <a:rPr lang="es" sz="1000" b="1" dirty="0">
+                          <a:latin typeface="Calibri"/>
+                          <a:ea typeface="Calibri"/>
+                          <a:cs typeface="Calibri"/>
+                        </a:rPr>
+                        <a:t>RECOMENDA-CIONES</a:t>
+                      </a:r>
+                      <a:endParaRPr sz="1000" b="1" dirty="0">
                         <a:latin typeface="Calibri"/>
                         <a:ea typeface="Calibri"/>
                         <a:cs typeface="Calibri"/>
@@ -17641,7 +18195,7 @@
                         <a:buNone/>
                       </a:pPr>
                       <a:r>
-                        <a:rPr lang="es" sz="800">
+                        <a:rPr lang="es" sz="800" dirty="0">
                           <a:latin typeface="Calibri"/>
                           <a:ea typeface="Calibri"/>
                           <a:cs typeface="Calibri"/>
@@ -17649,7 +18203,7 @@
                         </a:rPr>
                         <a:t>Recomendar eventos cercanos a la ubicación de los usuarios, clasificados por tipo de actividad deportiva, etc.</a:t>
                       </a:r>
-                      <a:endParaRPr sz="800">
+                      <a:endParaRPr sz="800" dirty="0">
                         <a:latin typeface="Calibri"/>
                         <a:ea typeface="Calibri"/>
                         <a:cs typeface="Calibri"/>
@@ -17826,7 +18380,7 @@
                         <a:buNone/>
                       </a:pPr>
                       <a:r>
-                        <a:rPr lang="es" sz="800">
+                        <a:rPr lang="es" sz="800" dirty="0">
                           <a:latin typeface="Calibri"/>
                           <a:ea typeface="Calibri"/>
                           <a:cs typeface="Calibri"/>
@@ -17834,7 +18388,7 @@
                         </a:rPr>
                         <a:t>Mostrar las valoraciones que otros usuarios han hecho de los participantes y organizadores, con un sistema sencillo y muy visual, que impida comentarios hirientes, ej.: carita sonriente, normal o triste</a:t>
                       </a:r>
-                      <a:endParaRPr sz="800">
+                      <a:endParaRPr sz="800" dirty="0">
                         <a:latin typeface="Calibri"/>
                         <a:ea typeface="Calibri"/>
                         <a:cs typeface="Calibri"/>
@@ -17899,7 +18453,7 @@
                         <a:buNone/>
                       </a:pPr>
                       <a:r>
-                        <a:rPr lang="es" sz="800">
+                        <a:rPr lang="es" sz="800" dirty="0">
                           <a:latin typeface="Calibri"/>
                           <a:ea typeface="Calibri"/>
                           <a:cs typeface="Calibri"/>
@@ -17907,7 +18461,7 @@
                         </a:rPr>
                         <a:t>Sistema de alertas de los mensajes enviados por otros usuarios</a:t>
                       </a:r>
-                      <a:endParaRPr sz="800">
+                      <a:endParaRPr sz="800" dirty="0">
                         <a:latin typeface="Calibri"/>
                         <a:ea typeface="Calibri"/>
                         <a:cs typeface="Calibri"/>
@@ -17972,7 +18526,7 @@
                         <a:buNone/>
                       </a:pPr>
                       <a:r>
-                        <a:rPr lang="es" sz="800">
+                        <a:rPr lang="es" sz="800" dirty="0">
                           <a:latin typeface="Calibri"/>
                           <a:ea typeface="Calibri"/>
                           <a:cs typeface="Calibri"/>
@@ -17980,7 +18534,7 @@
                         </a:rPr>
                         <a:t>Tener centralizado en una misma pantalla el estado en el que se encuentran las actividades organizadas; ejemplos de estado: número de usuarios inscritos y/o en lista de espera, actividad confirmada, cancelada o realizada, etc.</a:t>
                       </a:r>
-                      <a:endParaRPr sz="800">
+                      <a:endParaRPr sz="800" dirty="0">
                         <a:latin typeface="Calibri"/>
                         <a:ea typeface="Calibri"/>
                         <a:cs typeface="Calibri"/>
@@ -18045,7 +18599,7 @@
                         <a:buNone/>
                       </a:pPr>
                       <a:r>
-                        <a:rPr lang="es" sz="800">
+                        <a:rPr lang="es" sz="800" dirty="0">
                           <a:latin typeface="Calibri"/>
                           <a:ea typeface="Calibri"/>
                           <a:cs typeface="Calibri"/>
@@ -18053,7 +18607,7 @@
                         </a:rPr>
                         <a:t>Utilizar un sistema de valoración de los participantes que sea sencillo, visual y que impida comentarios hirientes. ej.: carita sonriente, normal o triste</a:t>
                       </a:r>
-                      <a:endParaRPr sz="800">
+                      <a:endParaRPr sz="800" dirty="0">
                         <a:latin typeface="Calibri"/>
                         <a:ea typeface="Calibri"/>
                         <a:cs typeface="Calibri"/>

</xml_diff>